<commit_message>
paperimages added and updated notebooks
</commit_message>
<xml_diff>
--- a/Figures.pptx
+++ b/Figures.pptx
@@ -9,6 +9,14 @@
     <p:sldId id="257" r:id="rId3"/>
     <p:sldId id="258" r:id="rId4"/>
     <p:sldId id="260" r:id="rId5"/>
+    <p:sldId id="261" r:id="rId6"/>
+    <p:sldId id="266" r:id="rId7"/>
+    <p:sldId id="262" r:id="rId8"/>
+    <p:sldId id="263" r:id="rId9"/>
+    <p:sldId id="264" r:id="rId10"/>
+    <p:sldId id="265" r:id="rId11"/>
+    <p:sldId id="267" r:id="rId12"/>
+    <p:sldId id="268" r:id="rId13"/>
   </p:sldIdLst>
   <p:sldSz cx="12192000" cy="6858000"/>
   <p:notesSz cx="6858000" cy="9144000"/>
@@ -262,7 +270,7 @@
           <a:p>
             <a:fld id="{00F463F2-4B55-8B45-9E50-4A52204CDC40}" type="datetimeFigureOut">
               <a:rPr lang="en-US" smtClean="0"/>
-              <a:t>12/15/19</a:t>
+              <a:t>12/18/19</a:t>
             </a:fld>
             <a:endParaRPr lang="en-US"/>
           </a:p>
@@ -460,7 +468,7 @@
           <a:p>
             <a:fld id="{00F463F2-4B55-8B45-9E50-4A52204CDC40}" type="datetimeFigureOut">
               <a:rPr lang="en-US" smtClean="0"/>
-              <a:t>12/15/19</a:t>
+              <a:t>12/18/19</a:t>
             </a:fld>
             <a:endParaRPr lang="en-US"/>
           </a:p>
@@ -668,7 +676,7 @@
           <a:p>
             <a:fld id="{00F463F2-4B55-8B45-9E50-4A52204CDC40}" type="datetimeFigureOut">
               <a:rPr lang="en-US" smtClean="0"/>
-              <a:t>12/15/19</a:t>
+              <a:t>12/18/19</a:t>
             </a:fld>
             <a:endParaRPr lang="en-US"/>
           </a:p>
@@ -866,7 +874,7 @@
           <a:p>
             <a:fld id="{00F463F2-4B55-8B45-9E50-4A52204CDC40}" type="datetimeFigureOut">
               <a:rPr lang="en-US" smtClean="0"/>
-              <a:t>12/15/19</a:t>
+              <a:t>12/18/19</a:t>
             </a:fld>
             <a:endParaRPr lang="en-US"/>
           </a:p>
@@ -1141,7 +1149,7 @@
           <a:p>
             <a:fld id="{00F463F2-4B55-8B45-9E50-4A52204CDC40}" type="datetimeFigureOut">
               <a:rPr lang="en-US" smtClean="0"/>
-              <a:t>12/15/19</a:t>
+              <a:t>12/18/19</a:t>
             </a:fld>
             <a:endParaRPr lang="en-US"/>
           </a:p>
@@ -1406,7 +1414,7 @@
           <a:p>
             <a:fld id="{00F463F2-4B55-8B45-9E50-4A52204CDC40}" type="datetimeFigureOut">
               <a:rPr lang="en-US" smtClean="0"/>
-              <a:t>12/15/19</a:t>
+              <a:t>12/18/19</a:t>
             </a:fld>
             <a:endParaRPr lang="en-US"/>
           </a:p>
@@ -1818,7 +1826,7 @@
           <a:p>
             <a:fld id="{00F463F2-4B55-8B45-9E50-4A52204CDC40}" type="datetimeFigureOut">
               <a:rPr lang="en-US" smtClean="0"/>
-              <a:t>12/15/19</a:t>
+              <a:t>12/18/19</a:t>
             </a:fld>
             <a:endParaRPr lang="en-US"/>
           </a:p>
@@ -1959,7 +1967,7 @@
           <a:p>
             <a:fld id="{00F463F2-4B55-8B45-9E50-4A52204CDC40}" type="datetimeFigureOut">
               <a:rPr lang="en-US" smtClean="0"/>
-              <a:t>12/15/19</a:t>
+              <a:t>12/18/19</a:t>
             </a:fld>
             <a:endParaRPr lang="en-US"/>
           </a:p>
@@ -2072,7 +2080,7 @@
           <a:p>
             <a:fld id="{00F463F2-4B55-8B45-9E50-4A52204CDC40}" type="datetimeFigureOut">
               <a:rPr lang="en-US" smtClean="0"/>
-              <a:t>12/15/19</a:t>
+              <a:t>12/18/19</a:t>
             </a:fld>
             <a:endParaRPr lang="en-US"/>
           </a:p>
@@ -2383,7 +2391,7 @@
           <a:p>
             <a:fld id="{00F463F2-4B55-8B45-9E50-4A52204CDC40}" type="datetimeFigureOut">
               <a:rPr lang="en-US" smtClean="0"/>
-              <a:t>12/15/19</a:t>
+              <a:t>12/18/19</a:t>
             </a:fld>
             <a:endParaRPr lang="en-US"/>
           </a:p>
@@ -2671,7 +2679,7 @@
           <a:p>
             <a:fld id="{00F463F2-4B55-8B45-9E50-4A52204CDC40}" type="datetimeFigureOut">
               <a:rPr lang="en-US" smtClean="0"/>
-              <a:t>12/15/19</a:t>
+              <a:t>12/18/19</a:t>
             </a:fld>
             <a:endParaRPr lang="en-US"/>
           </a:p>
@@ -2912,7 +2920,7 @@
           <a:p>
             <a:fld id="{00F463F2-4B55-8B45-9E50-4A52204CDC40}" type="datetimeFigureOut">
               <a:rPr lang="en-US" smtClean="0"/>
-              <a:t>12/15/19</a:t>
+              <a:t>12/18/19</a:t>
             </a:fld>
             <a:endParaRPr lang="en-US"/>
           </a:p>
@@ -3386,6 +3394,776 @@
     <p:extLst>
       <p:ext uri="{BB962C8B-B14F-4D97-AF65-F5344CB8AC3E}">
         <p14:creationId xmlns:p14="http://schemas.microsoft.com/office/powerpoint/2010/main" val="2355953742"/>
+      </p:ext>
+    </p:extLst>
+  </p:cSld>
+  <p:clrMapOvr>
+    <a:masterClrMapping/>
+  </p:clrMapOvr>
+</p:sld>
+</file>
+
+<file path=ppt/slides/slide10.xml><?xml version="1.0" encoding="utf-8"?>
+<p:sld xmlns:a="http://schemas.openxmlformats.org/drawingml/2006/main" xmlns:r="http://schemas.openxmlformats.org/officeDocument/2006/relationships" xmlns:p="http://schemas.openxmlformats.org/presentationml/2006/main">
+  <p:cSld>
+    <p:spTree>
+      <p:nvGrpSpPr>
+        <p:cNvPr id="1" name=""/>
+        <p:cNvGrpSpPr/>
+        <p:nvPr/>
+      </p:nvGrpSpPr>
+      <p:grpSpPr>
+        <a:xfrm>
+          <a:off x="0" y="0"/>
+          <a:ext cx="0" cy="0"/>
+          <a:chOff x="0" y="0"/>
+          <a:chExt cx="0" cy="0"/>
+        </a:xfrm>
+      </p:grpSpPr>
+      <p:pic>
+        <p:nvPicPr>
+          <p:cNvPr id="3" name="Picture 2">
+            <a:extLst>
+              <a:ext uri="{FF2B5EF4-FFF2-40B4-BE49-F238E27FC236}">
+                <a16:creationId xmlns:a16="http://schemas.microsoft.com/office/drawing/2014/main" id="{B6465E1F-3CD8-924D-83C7-F423118189EB}"/>
+              </a:ext>
+            </a:extLst>
+          </p:cNvPr>
+          <p:cNvPicPr>
+            <a:picLocks noChangeAspect="1"/>
+          </p:cNvPicPr>
+          <p:nvPr/>
+        </p:nvPicPr>
+        <p:blipFill>
+          <a:blip r:embed="rId2"/>
+          <a:stretch>
+            <a:fillRect/>
+          </a:stretch>
+        </p:blipFill>
+        <p:spPr>
+          <a:xfrm>
+            <a:off x="944335" y="-10885"/>
+            <a:ext cx="10303329" cy="6868885"/>
+          </a:xfrm>
+          <a:prstGeom prst="rect">
+            <a:avLst/>
+          </a:prstGeom>
+        </p:spPr>
+      </p:pic>
+      <mc:AlternateContent xmlns:mc="http://schemas.openxmlformats.org/markup-compatibility/2006">
+        <mc:Choice xmlns:a14="http://schemas.microsoft.com/office/drawing/2010/main" Requires="a14">
+          <p:sp>
+            <p:nvSpPr>
+              <p:cNvPr id="4" name="Rectangle 3">
+                <a:extLst>
+                  <a:ext uri="{FF2B5EF4-FFF2-40B4-BE49-F238E27FC236}">
+                    <a16:creationId xmlns:a16="http://schemas.microsoft.com/office/drawing/2014/main" id="{4380A198-8975-5B43-873D-B4724F39C24F}"/>
+                  </a:ext>
+                </a:extLst>
+              </p:cNvPr>
+              <p:cNvSpPr/>
+              <p:nvPr/>
+            </p:nvSpPr>
+            <p:spPr>
+              <a:xfrm rot="16200000">
+                <a:off x="593263" y="3198167"/>
+                <a:ext cx="1566776" cy="461665"/>
+              </a:xfrm>
+              <a:prstGeom prst="rect">
+                <a:avLst/>
+              </a:prstGeom>
+            </p:spPr>
+            <p:txBody>
+              <a:bodyPr wrap="none">
+                <a:spAutoFit/>
+              </a:bodyPr>
+              <a:lstStyle/>
+              <a:p>
+                <a14:m>
+                  <m:oMath xmlns:m="http://schemas.openxmlformats.org/officeDocument/2006/math">
+                    <m:r>
+                      <a:rPr lang="en-US" sz="2400" i="1">
+                        <a:latin typeface="Cambria Math" panose="02040503050406030204" pitchFamily="18" charset="0"/>
+                      </a:rPr>
+                      <m:t>𝜙</m:t>
+                    </m:r>
+                  </m:oMath>
+                </a14:m>
+                <a:r>
+                  <a:rPr lang="en-US" sz="2400" dirty="0"/>
+                  <a:t> (radians)</a:t>
+                </a:r>
+              </a:p>
+            </p:txBody>
+          </p:sp>
+        </mc:Choice>
+        <mc:Fallback>
+          <p:sp>
+            <p:nvSpPr>
+              <p:cNvPr id="4" name="Rectangle 3">
+                <a:extLst>
+                  <a:ext uri="{FF2B5EF4-FFF2-40B4-BE49-F238E27FC236}">
+                    <a16:creationId xmlns:a16="http://schemas.microsoft.com/office/drawing/2014/main" id="{4380A198-8975-5B43-873D-B4724F39C24F}"/>
+                  </a:ext>
+                </a:extLst>
+              </p:cNvPr>
+              <p:cNvSpPr>
+                <a:spLocks noRot="1" noChangeAspect="1" noMove="1" noResize="1" noEditPoints="1" noAdjustHandles="1" noChangeArrowheads="1" noChangeShapeType="1" noTextEdit="1"/>
+              </p:cNvSpPr>
+              <p:nvPr/>
+            </p:nvSpPr>
+            <p:spPr>
+              <a:xfrm rot="16200000">
+                <a:off x="593263" y="3198167"/>
+                <a:ext cx="1566776" cy="461665"/>
+              </a:xfrm>
+              <a:prstGeom prst="rect">
+                <a:avLst/>
+              </a:prstGeom>
+              <a:blipFill>
+                <a:blip r:embed="rId3"/>
+                <a:stretch>
+                  <a:fillRect l="-5263" t="-4000" r="-26316" b="-2400"/>
+                </a:stretch>
+              </a:blipFill>
+            </p:spPr>
+            <p:txBody>
+              <a:bodyPr/>
+              <a:lstStyle/>
+              <a:p>
+                <a:r>
+                  <a:rPr lang="en-US">
+                    <a:noFill/>
+                  </a:rPr>
+                  <a:t> </a:t>
+                </a:r>
+              </a:p>
+            </p:txBody>
+          </p:sp>
+        </mc:Fallback>
+      </mc:AlternateContent>
+      <mc:AlternateContent xmlns:mc="http://schemas.openxmlformats.org/markup-compatibility/2006">
+        <mc:Choice xmlns:a14="http://schemas.microsoft.com/office/drawing/2010/main" Requires="a14">
+          <p:sp>
+            <p:nvSpPr>
+              <p:cNvPr id="5" name="Rectangle 4">
+                <a:extLst>
+                  <a:ext uri="{FF2B5EF4-FFF2-40B4-BE49-F238E27FC236}">
+                    <a16:creationId xmlns:a16="http://schemas.microsoft.com/office/drawing/2014/main" id="{FAE4AAE3-754A-B744-BB82-72DD9C0597FE}"/>
+                  </a:ext>
+                </a:extLst>
+              </p:cNvPr>
+              <p:cNvSpPr/>
+              <p:nvPr/>
+            </p:nvSpPr>
+            <p:spPr>
+              <a:xfrm>
+                <a:off x="5921078" y="6363091"/>
+                <a:ext cx="966290" cy="461665"/>
+              </a:xfrm>
+              <a:prstGeom prst="rect">
+                <a:avLst/>
+              </a:prstGeom>
+            </p:spPr>
+            <p:txBody>
+              <a:bodyPr wrap="none">
+                <a:spAutoFit/>
+              </a:bodyPr>
+              <a:lstStyle/>
+              <a:p>
+                <a14:m>
+                  <m:oMath xmlns:m="http://schemas.openxmlformats.org/officeDocument/2006/math">
+                    <m:sSub>
+                      <m:sSubPr>
+                        <m:ctrlPr>
+                          <a:rPr lang="en-US" sz="2400">
+                            <a:latin typeface="Cambria Math" panose="02040503050406030204" pitchFamily="18" charset="0"/>
+                          </a:rPr>
+                        </m:ctrlPr>
+                      </m:sSubPr>
+                      <m:e>
+                        <m:r>
+                          <a:rPr lang="en-US" sz="2400" i="1">
+                            <a:latin typeface="Cambria Math" panose="02040503050406030204" pitchFamily="18" charset="0"/>
+                          </a:rPr>
+                          <m:t>𝜉</m:t>
+                        </m:r>
+                      </m:e>
+                      <m:sub>
+                        <m:r>
+                          <a:rPr lang="en-US" sz="2400" i="0">
+                            <a:latin typeface="Cambria Math" panose="02040503050406030204" pitchFamily="18" charset="0"/>
+                          </a:rPr>
+                          <m:t>0</m:t>
+                        </m:r>
+                      </m:sub>
+                    </m:sSub>
+                  </m:oMath>
+                </a14:m>
+                <a:r>
+                  <a:rPr lang="en-US" sz="2400" dirty="0"/>
+                  <a:t> (m)</a:t>
+                </a:r>
+              </a:p>
+            </p:txBody>
+          </p:sp>
+        </mc:Choice>
+        <mc:Fallback>
+          <p:sp>
+            <p:nvSpPr>
+              <p:cNvPr id="5" name="Rectangle 4">
+                <a:extLst>
+                  <a:ext uri="{FF2B5EF4-FFF2-40B4-BE49-F238E27FC236}">
+                    <a16:creationId xmlns:a16="http://schemas.microsoft.com/office/drawing/2014/main" id="{FAE4AAE3-754A-B744-BB82-72DD9C0597FE}"/>
+                  </a:ext>
+                </a:extLst>
+              </p:cNvPr>
+              <p:cNvSpPr>
+                <a:spLocks noRot="1" noChangeAspect="1" noMove="1" noResize="1" noEditPoints="1" noAdjustHandles="1" noChangeArrowheads="1" noChangeShapeType="1" noTextEdit="1"/>
+              </p:cNvSpPr>
+              <p:nvPr/>
+            </p:nvSpPr>
+            <p:spPr>
+              <a:xfrm>
+                <a:off x="5921078" y="6363091"/>
+                <a:ext cx="966290" cy="461665"/>
+              </a:xfrm>
+              <a:prstGeom prst="rect">
+                <a:avLst/>
+              </a:prstGeom>
+              <a:blipFill>
+                <a:blip r:embed="rId4"/>
+                <a:stretch>
+                  <a:fillRect l="-3896" t="-5405" r="-9091" b="-29730"/>
+                </a:stretch>
+              </a:blipFill>
+            </p:spPr>
+            <p:txBody>
+              <a:bodyPr/>
+              <a:lstStyle/>
+              <a:p>
+                <a:r>
+                  <a:rPr lang="en-US">
+                    <a:noFill/>
+                  </a:rPr>
+                  <a:t> </a:t>
+                </a:r>
+              </a:p>
+            </p:txBody>
+          </p:sp>
+        </mc:Fallback>
+      </mc:AlternateContent>
+    </p:spTree>
+    <p:extLst>
+      <p:ext uri="{BB962C8B-B14F-4D97-AF65-F5344CB8AC3E}">
+        <p14:creationId xmlns:p14="http://schemas.microsoft.com/office/powerpoint/2010/main" val="3304228960"/>
+      </p:ext>
+    </p:extLst>
+  </p:cSld>
+  <p:clrMapOvr>
+    <a:masterClrMapping/>
+  </p:clrMapOvr>
+</p:sld>
+</file>
+
+<file path=ppt/slides/slide11.xml><?xml version="1.0" encoding="utf-8"?>
+<p:sld xmlns:a="http://schemas.openxmlformats.org/drawingml/2006/main" xmlns:r="http://schemas.openxmlformats.org/officeDocument/2006/relationships" xmlns:p="http://schemas.openxmlformats.org/presentationml/2006/main">
+  <p:cSld>
+    <p:spTree>
+      <p:nvGrpSpPr>
+        <p:cNvPr id="1" name=""/>
+        <p:cNvGrpSpPr/>
+        <p:nvPr/>
+      </p:nvGrpSpPr>
+      <p:grpSpPr>
+        <a:xfrm>
+          <a:off x="0" y="0"/>
+          <a:ext cx="0" cy="0"/>
+          <a:chOff x="0" y="0"/>
+          <a:chExt cx="0" cy="0"/>
+        </a:xfrm>
+      </p:grpSpPr>
+      <p:pic>
+        <p:nvPicPr>
+          <p:cNvPr id="8" name="Picture 7">
+            <a:extLst>
+              <a:ext uri="{FF2B5EF4-FFF2-40B4-BE49-F238E27FC236}">
+                <a16:creationId xmlns:a16="http://schemas.microsoft.com/office/drawing/2014/main" id="{25D217CB-D0CD-704E-BD39-180E17DB529E}"/>
+              </a:ext>
+            </a:extLst>
+          </p:cNvPr>
+          <p:cNvPicPr>
+            <a:picLocks noChangeAspect="1"/>
+          </p:cNvPicPr>
+          <p:nvPr/>
+        </p:nvPicPr>
+        <p:blipFill>
+          <a:blip r:embed="rId2"/>
+          <a:stretch>
+            <a:fillRect/>
+          </a:stretch>
+        </p:blipFill>
+        <p:spPr>
+          <a:xfrm>
+            <a:off x="1145817" y="33244"/>
+            <a:ext cx="10187269" cy="6791512"/>
+          </a:xfrm>
+          <a:prstGeom prst="rect">
+            <a:avLst/>
+          </a:prstGeom>
+        </p:spPr>
+      </p:pic>
+      <mc:AlternateContent xmlns:mc="http://schemas.openxmlformats.org/markup-compatibility/2006">
+        <mc:Choice xmlns:a14="http://schemas.microsoft.com/office/drawing/2010/main" Requires="a14">
+          <p:sp>
+            <p:nvSpPr>
+              <p:cNvPr id="9" name="Rectangle 8">
+                <a:extLst>
+                  <a:ext uri="{FF2B5EF4-FFF2-40B4-BE49-F238E27FC236}">
+                    <a16:creationId xmlns:a16="http://schemas.microsoft.com/office/drawing/2014/main" id="{E19941B2-28E3-FC46-B80C-FED51C505703}"/>
+                  </a:ext>
+                </a:extLst>
+              </p:cNvPr>
+              <p:cNvSpPr/>
+              <p:nvPr/>
+            </p:nvSpPr>
+            <p:spPr>
+              <a:xfrm rot="16200000">
+                <a:off x="593263" y="3198167"/>
+                <a:ext cx="1566776" cy="461665"/>
+              </a:xfrm>
+              <a:prstGeom prst="rect">
+                <a:avLst/>
+              </a:prstGeom>
+            </p:spPr>
+            <p:txBody>
+              <a:bodyPr wrap="none">
+                <a:spAutoFit/>
+              </a:bodyPr>
+              <a:lstStyle/>
+              <a:p>
+                <a14:m>
+                  <m:oMath xmlns:m="http://schemas.openxmlformats.org/officeDocument/2006/math">
+                    <m:r>
+                      <a:rPr lang="en-US" sz="2400" i="1">
+                        <a:latin typeface="Cambria Math" panose="02040503050406030204" pitchFamily="18" charset="0"/>
+                      </a:rPr>
+                      <m:t>𝜙</m:t>
+                    </m:r>
+                  </m:oMath>
+                </a14:m>
+                <a:r>
+                  <a:rPr lang="en-US" sz="2400" dirty="0"/>
+                  <a:t> (radians)</a:t>
+                </a:r>
+              </a:p>
+            </p:txBody>
+          </p:sp>
+        </mc:Choice>
+        <mc:Fallback>
+          <p:sp>
+            <p:nvSpPr>
+              <p:cNvPr id="9" name="Rectangle 8">
+                <a:extLst>
+                  <a:ext uri="{FF2B5EF4-FFF2-40B4-BE49-F238E27FC236}">
+                    <a16:creationId xmlns:a16="http://schemas.microsoft.com/office/drawing/2014/main" id="{E19941B2-28E3-FC46-B80C-FED51C505703}"/>
+                  </a:ext>
+                </a:extLst>
+              </p:cNvPr>
+              <p:cNvSpPr>
+                <a:spLocks noRot="1" noChangeAspect="1" noMove="1" noResize="1" noEditPoints="1" noAdjustHandles="1" noChangeArrowheads="1" noChangeShapeType="1" noTextEdit="1"/>
+              </p:cNvSpPr>
+              <p:nvPr/>
+            </p:nvSpPr>
+            <p:spPr>
+              <a:xfrm rot="16200000">
+                <a:off x="593263" y="3198167"/>
+                <a:ext cx="1566776" cy="461665"/>
+              </a:xfrm>
+              <a:prstGeom prst="rect">
+                <a:avLst/>
+              </a:prstGeom>
+              <a:blipFill>
+                <a:blip r:embed="rId3"/>
+                <a:stretch>
+                  <a:fillRect l="-5263" t="-4000" r="-26316" b="-2400"/>
+                </a:stretch>
+              </a:blipFill>
+            </p:spPr>
+            <p:txBody>
+              <a:bodyPr/>
+              <a:lstStyle/>
+              <a:p>
+                <a:r>
+                  <a:rPr lang="en-US">
+                    <a:noFill/>
+                  </a:rPr>
+                  <a:t> </a:t>
+                </a:r>
+              </a:p>
+            </p:txBody>
+          </p:sp>
+        </mc:Fallback>
+      </mc:AlternateContent>
+      <mc:AlternateContent xmlns:mc="http://schemas.openxmlformats.org/markup-compatibility/2006">
+        <mc:Choice xmlns:a14="http://schemas.microsoft.com/office/drawing/2010/main" Requires="a14">
+          <p:sp>
+            <p:nvSpPr>
+              <p:cNvPr id="10" name="Rectangle 9">
+                <a:extLst>
+                  <a:ext uri="{FF2B5EF4-FFF2-40B4-BE49-F238E27FC236}">
+                    <a16:creationId xmlns:a16="http://schemas.microsoft.com/office/drawing/2014/main" id="{6901C236-34BD-8749-8076-E9C00C15BB23}"/>
+                  </a:ext>
+                </a:extLst>
+              </p:cNvPr>
+              <p:cNvSpPr/>
+              <p:nvPr/>
+            </p:nvSpPr>
+            <p:spPr>
+              <a:xfrm>
+                <a:off x="5921078" y="6363091"/>
+                <a:ext cx="966290" cy="461665"/>
+              </a:xfrm>
+              <a:prstGeom prst="rect">
+                <a:avLst/>
+              </a:prstGeom>
+            </p:spPr>
+            <p:txBody>
+              <a:bodyPr wrap="none">
+                <a:spAutoFit/>
+              </a:bodyPr>
+              <a:lstStyle/>
+              <a:p>
+                <a14:m>
+                  <m:oMath xmlns:m="http://schemas.openxmlformats.org/officeDocument/2006/math">
+                    <m:sSub>
+                      <m:sSubPr>
+                        <m:ctrlPr>
+                          <a:rPr lang="en-US" sz="2400">
+                            <a:latin typeface="Cambria Math" panose="02040503050406030204" pitchFamily="18" charset="0"/>
+                          </a:rPr>
+                        </m:ctrlPr>
+                      </m:sSubPr>
+                      <m:e>
+                        <m:r>
+                          <a:rPr lang="en-US" sz="2400" i="1">
+                            <a:latin typeface="Cambria Math" panose="02040503050406030204" pitchFamily="18" charset="0"/>
+                          </a:rPr>
+                          <m:t>𝜉</m:t>
+                        </m:r>
+                      </m:e>
+                      <m:sub>
+                        <m:r>
+                          <a:rPr lang="en-US" sz="2400" i="0">
+                            <a:latin typeface="Cambria Math" panose="02040503050406030204" pitchFamily="18" charset="0"/>
+                          </a:rPr>
+                          <m:t>0</m:t>
+                        </m:r>
+                      </m:sub>
+                    </m:sSub>
+                  </m:oMath>
+                </a14:m>
+                <a:r>
+                  <a:rPr lang="en-US" sz="2400" dirty="0"/>
+                  <a:t> (m)</a:t>
+                </a:r>
+              </a:p>
+            </p:txBody>
+          </p:sp>
+        </mc:Choice>
+        <mc:Fallback>
+          <p:sp>
+            <p:nvSpPr>
+              <p:cNvPr id="10" name="Rectangle 9">
+                <a:extLst>
+                  <a:ext uri="{FF2B5EF4-FFF2-40B4-BE49-F238E27FC236}">
+                    <a16:creationId xmlns:a16="http://schemas.microsoft.com/office/drawing/2014/main" id="{6901C236-34BD-8749-8076-E9C00C15BB23}"/>
+                  </a:ext>
+                </a:extLst>
+              </p:cNvPr>
+              <p:cNvSpPr>
+                <a:spLocks noRot="1" noChangeAspect="1" noMove="1" noResize="1" noEditPoints="1" noAdjustHandles="1" noChangeArrowheads="1" noChangeShapeType="1" noTextEdit="1"/>
+              </p:cNvSpPr>
+              <p:nvPr/>
+            </p:nvSpPr>
+            <p:spPr>
+              <a:xfrm>
+                <a:off x="5921078" y="6363091"/>
+                <a:ext cx="966290" cy="461665"/>
+              </a:xfrm>
+              <a:prstGeom prst="rect">
+                <a:avLst/>
+              </a:prstGeom>
+              <a:blipFill>
+                <a:blip r:embed="rId4"/>
+                <a:stretch>
+                  <a:fillRect l="-3896" t="-5405" r="-9091" b="-29730"/>
+                </a:stretch>
+              </a:blipFill>
+            </p:spPr>
+            <p:txBody>
+              <a:bodyPr/>
+              <a:lstStyle/>
+              <a:p>
+                <a:r>
+                  <a:rPr lang="en-US">
+                    <a:noFill/>
+                  </a:rPr>
+                  <a:t> </a:t>
+                </a:r>
+              </a:p>
+            </p:txBody>
+          </p:sp>
+        </mc:Fallback>
+      </mc:AlternateContent>
+    </p:spTree>
+    <p:extLst>
+      <p:ext uri="{BB962C8B-B14F-4D97-AF65-F5344CB8AC3E}">
+        <p14:creationId xmlns:p14="http://schemas.microsoft.com/office/powerpoint/2010/main" val="3745702176"/>
+      </p:ext>
+    </p:extLst>
+  </p:cSld>
+  <p:clrMapOvr>
+    <a:masterClrMapping/>
+  </p:clrMapOvr>
+</p:sld>
+</file>
+
+<file path=ppt/slides/slide12.xml><?xml version="1.0" encoding="utf-8"?>
+<p:sld xmlns:a="http://schemas.openxmlformats.org/drawingml/2006/main" xmlns:r="http://schemas.openxmlformats.org/officeDocument/2006/relationships" xmlns:p="http://schemas.openxmlformats.org/presentationml/2006/main">
+  <p:cSld>
+    <p:spTree>
+      <p:nvGrpSpPr>
+        <p:cNvPr id="1" name=""/>
+        <p:cNvGrpSpPr/>
+        <p:nvPr/>
+      </p:nvGrpSpPr>
+      <p:grpSpPr>
+        <a:xfrm>
+          <a:off x="0" y="0"/>
+          <a:ext cx="0" cy="0"/>
+          <a:chOff x="0" y="0"/>
+          <a:chExt cx="0" cy="0"/>
+        </a:xfrm>
+      </p:grpSpPr>
+      <p:pic>
+        <p:nvPicPr>
+          <p:cNvPr id="3" name="Picture 2">
+            <a:extLst>
+              <a:ext uri="{FF2B5EF4-FFF2-40B4-BE49-F238E27FC236}">
+                <a16:creationId xmlns:a16="http://schemas.microsoft.com/office/drawing/2014/main" id="{0743F7B0-77AF-E240-8D0B-1055CC1C6F61}"/>
+              </a:ext>
+            </a:extLst>
+          </p:cNvPr>
+          <p:cNvPicPr>
+            <a:picLocks noChangeAspect="1"/>
+          </p:cNvPicPr>
+          <p:nvPr/>
+        </p:nvPicPr>
+        <p:blipFill>
+          <a:blip r:embed="rId2"/>
+          <a:stretch>
+            <a:fillRect/>
+          </a:stretch>
+        </p:blipFill>
+        <p:spPr>
+          <a:xfrm>
+            <a:off x="926713" y="-43874"/>
+            <a:ext cx="10132373" cy="6754915"/>
+          </a:xfrm>
+          <a:prstGeom prst="rect">
+            <a:avLst/>
+          </a:prstGeom>
+        </p:spPr>
+      </p:pic>
+      <mc:AlternateContent xmlns:mc="http://schemas.openxmlformats.org/markup-compatibility/2006">
+        <mc:Choice xmlns:a14="http://schemas.microsoft.com/office/drawing/2010/main" Requires="a14">
+          <p:sp>
+            <p:nvSpPr>
+              <p:cNvPr id="4" name="Rectangle 3">
+                <a:extLst>
+                  <a:ext uri="{FF2B5EF4-FFF2-40B4-BE49-F238E27FC236}">
+                    <a16:creationId xmlns:a16="http://schemas.microsoft.com/office/drawing/2014/main" id="{2FEBD1F9-510A-7949-966A-105978F7905F}"/>
+                  </a:ext>
+                </a:extLst>
+              </p:cNvPr>
+              <p:cNvSpPr/>
+              <p:nvPr/>
+            </p:nvSpPr>
+            <p:spPr>
+              <a:xfrm>
+                <a:off x="5604230" y="6218598"/>
+                <a:ext cx="983539" cy="492443"/>
+              </a:xfrm>
+              <a:prstGeom prst="rect">
+                <a:avLst/>
+              </a:prstGeom>
+            </p:spPr>
+            <p:txBody>
+              <a:bodyPr wrap="none">
+                <a:spAutoFit/>
+              </a:bodyPr>
+              <a:lstStyle/>
+              <a:p>
+                <a14:m>
+                  <m:oMath xmlns:m="http://schemas.openxmlformats.org/officeDocument/2006/math">
+                    <m:r>
+                      <a:rPr lang="en-US" sz="2600" i="1">
+                        <a:latin typeface="Cambria Math" panose="02040503050406030204" pitchFamily="18" charset="0"/>
+                      </a:rPr>
+                      <m:t>𝑥</m:t>
+                    </m:r>
+                  </m:oMath>
+                </a14:m>
+                <a:r>
+                  <a:rPr lang="en-US" sz="2600" dirty="0"/>
+                  <a:t>-axis</a:t>
+                </a:r>
+              </a:p>
+            </p:txBody>
+          </p:sp>
+        </mc:Choice>
+        <mc:Fallback>
+          <p:sp>
+            <p:nvSpPr>
+              <p:cNvPr id="4" name="Rectangle 3">
+                <a:extLst>
+                  <a:ext uri="{FF2B5EF4-FFF2-40B4-BE49-F238E27FC236}">
+                    <a16:creationId xmlns:a16="http://schemas.microsoft.com/office/drawing/2014/main" id="{2FEBD1F9-510A-7949-966A-105978F7905F}"/>
+                  </a:ext>
+                </a:extLst>
+              </p:cNvPr>
+              <p:cNvSpPr>
+                <a:spLocks noRot="1" noChangeAspect="1" noMove="1" noResize="1" noEditPoints="1" noAdjustHandles="1" noChangeArrowheads="1" noChangeShapeType="1" noTextEdit="1"/>
+              </p:cNvSpPr>
+              <p:nvPr/>
+            </p:nvSpPr>
+            <p:spPr>
+              <a:xfrm>
+                <a:off x="5604230" y="6218598"/>
+                <a:ext cx="983539" cy="492443"/>
+              </a:xfrm>
+              <a:prstGeom prst="rect">
+                <a:avLst/>
+              </a:prstGeom>
+              <a:blipFill>
+                <a:blip r:embed="rId3"/>
+                <a:stretch>
+                  <a:fillRect t="-10256" r="-8861" b="-30769"/>
+                </a:stretch>
+              </a:blipFill>
+            </p:spPr>
+            <p:txBody>
+              <a:bodyPr/>
+              <a:lstStyle/>
+              <a:p>
+                <a:r>
+                  <a:rPr lang="en-US">
+                    <a:noFill/>
+                  </a:rPr>
+                  <a:t> </a:t>
+                </a:r>
+              </a:p>
+            </p:txBody>
+          </p:sp>
+        </mc:Fallback>
+      </mc:AlternateContent>
+      <mc:AlternateContent xmlns:mc="http://schemas.openxmlformats.org/markup-compatibility/2006">
+        <mc:Choice xmlns:a14="http://schemas.microsoft.com/office/drawing/2010/main" Requires="a14">
+          <p:sp>
+            <p:nvSpPr>
+              <p:cNvPr id="5" name="Rectangle 4">
+                <a:extLst>
+                  <a:ext uri="{FF2B5EF4-FFF2-40B4-BE49-F238E27FC236}">
+                    <a16:creationId xmlns:a16="http://schemas.microsoft.com/office/drawing/2014/main" id="{1AD06BDE-97AB-7E43-B82F-9B6D163ED82E}"/>
+                  </a:ext>
+                </a:extLst>
+              </p:cNvPr>
+              <p:cNvSpPr/>
+              <p:nvPr/>
+            </p:nvSpPr>
+            <p:spPr>
+              <a:xfrm rot="16200000">
+                <a:off x="691361" y="3087362"/>
+                <a:ext cx="963149" cy="492443"/>
+              </a:xfrm>
+              <a:prstGeom prst="rect">
+                <a:avLst/>
+              </a:prstGeom>
+            </p:spPr>
+            <p:txBody>
+              <a:bodyPr wrap="none">
+                <a:spAutoFit/>
+              </a:bodyPr>
+              <a:lstStyle/>
+              <a:p>
+                <a14:m>
+                  <m:oMath xmlns:m="http://schemas.openxmlformats.org/officeDocument/2006/math">
+                    <m:r>
+                      <a:rPr lang="en-US" sz="2600" b="0" i="1" smtClean="0">
+                        <a:latin typeface="Cambria Math" panose="02040503050406030204" pitchFamily="18" charset="0"/>
+                      </a:rPr>
+                      <m:t>𝑧</m:t>
+                    </m:r>
+                  </m:oMath>
+                </a14:m>
+                <a:r>
+                  <a:rPr lang="en-US" sz="2600" dirty="0"/>
+                  <a:t>-axis</a:t>
+                </a:r>
+              </a:p>
+            </p:txBody>
+          </p:sp>
+        </mc:Choice>
+        <mc:Fallback>
+          <p:sp>
+            <p:nvSpPr>
+              <p:cNvPr id="5" name="Rectangle 4">
+                <a:extLst>
+                  <a:ext uri="{FF2B5EF4-FFF2-40B4-BE49-F238E27FC236}">
+                    <a16:creationId xmlns:a16="http://schemas.microsoft.com/office/drawing/2014/main" id="{1AD06BDE-97AB-7E43-B82F-9B6D163ED82E}"/>
+                  </a:ext>
+                </a:extLst>
+              </p:cNvPr>
+              <p:cNvSpPr>
+                <a:spLocks noRot="1" noChangeAspect="1" noMove="1" noResize="1" noEditPoints="1" noAdjustHandles="1" noChangeArrowheads="1" noChangeShapeType="1" noTextEdit="1"/>
+              </p:cNvSpPr>
+              <p:nvPr/>
+            </p:nvSpPr>
+            <p:spPr>
+              <a:xfrm rot="16200000">
+                <a:off x="691361" y="3087362"/>
+                <a:ext cx="963149" cy="492443"/>
+              </a:xfrm>
+              <a:prstGeom prst="rect">
+                <a:avLst/>
+              </a:prstGeom>
+              <a:blipFill>
+                <a:blip r:embed="rId4"/>
+                <a:stretch>
+                  <a:fillRect l="-10000" t="-10526" r="-27500"/>
+                </a:stretch>
+              </a:blipFill>
+            </p:spPr>
+            <p:txBody>
+              <a:bodyPr/>
+              <a:lstStyle/>
+              <a:p>
+                <a:r>
+                  <a:rPr lang="en-US">
+                    <a:noFill/>
+                  </a:rPr>
+                  <a:t> </a:t>
+                </a:r>
+              </a:p>
+            </p:txBody>
+          </p:sp>
+        </mc:Fallback>
+      </mc:AlternateContent>
+    </p:spTree>
+    <p:extLst>
+      <p:ext uri="{BB962C8B-B14F-4D97-AF65-F5344CB8AC3E}">
+        <p14:creationId xmlns:p14="http://schemas.microsoft.com/office/powerpoint/2010/main" val="1067802271"/>
       </p:ext>
     </p:extLst>
   </p:cSld>
@@ -7122,7 +7900,7 @@
             <p:spPr>
               <a:xfrm>
                 <a:off x="4235316" y="4922324"/>
-                <a:ext cx="399597" cy="369332"/>
+                <a:ext cx="374141" cy="369332"/>
               </a:xfrm>
               <a:prstGeom prst="rect">
                 <a:avLst/>
@@ -7142,10 +7920,10 @@
                     </m:oMathParaPr>
                     <m:oMath xmlns:m="http://schemas.openxmlformats.org/officeDocument/2006/math">
                       <m:r>
-                        <a:rPr lang="en-US" i="1" smtClean="0">
+                        <a:rPr lang="en-US" b="0" i="1" smtClean="0">
                           <a:latin typeface="Cambria Math" panose="02040503050406030204" pitchFamily="18" charset="0"/>
                         </a:rPr>
-                        <m:t>𝜙</m:t>
+                        <m:t>𝜃</m:t>
                       </m:r>
                     </m:oMath>
                   </m:oMathPara>
@@ -7173,7 +7951,7 @@
             <p:spPr>
               <a:xfrm>
                 <a:off x="4235316" y="4922324"/>
-                <a:ext cx="399597" cy="369332"/>
+                <a:ext cx="374141" cy="369332"/>
               </a:xfrm>
               <a:prstGeom prst="rect">
                 <a:avLst/>
@@ -7181,7 +7959,7 @@
               <a:blipFill>
                 <a:blip r:embed="rId9"/>
                 <a:stretch>
-                  <a:fillRect b="-10000"/>
+                  <a:fillRect/>
                 </a:stretch>
               </a:blipFill>
             </p:spPr>
@@ -7200,8 +7978,8 @@
           </p:sp>
         </mc:Fallback>
       </mc:AlternateContent>
-      <mc:AlternateContent xmlns:mc="http://schemas.openxmlformats.org/markup-compatibility/2006">
-        <mc:Choice xmlns:a14="http://schemas.microsoft.com/office/drawing/2010/main" Requires="a14">
+      <mc:AlternateContent xmlns:mc="http://schemas.openxmlformats.org/markup-compatibility/2006" xmlns:a14="http://schemas.microsoft.com/office/drawing/2010/main">
+        <mc:Choice Requires="a14">
           <p:sp>
             <p:nvSpPr>
               <p:cNvPr id="70" name="Rectangle 69">
@@ -7217,7 +7995,7 @@
             <p:spPr>
               <a:xfrm>
                 <a:off x="2155093" y="5780598"/>
-                <a:ext cx="2395464" cy="620298"/>
+                <a:ext cx="2368212" cy="620298"/>
               </a:xfrm>
               <a:prstGeom prst="rect">
                 <a:avLst/>
@@ -7273,10 +8051,10 @@
                             <m:t>𝐴𝑐𝑜𝑠</m:t>
                           </m:r>
                           <m:r>
-                            <a:rPr lang="en-US" i="1">
+                            <a:rPr lang="en-US" b="0" i="1" smtClean="0">
                               <a:latin typeface="Cambria Math" panose="02040503050406030204" pitchFamily="18" charset="0"/>
                             </a:rPr>
-                            <m:t>𝜙</m:t>
+                            <m:t>𝜃</m:t>
                           </m:r>
                           <m:r>
                             <a:rPr lang="en-US" i="1">
@@ -7346,7 +8124,7 @@
             </p:txBody>
           </p:sp>
         </mc:Choice>
-        <mc:Fallback>
+        <mc:Fallback xmlns="">
           <p:sp>
             <p:nvSpPr>
               <p:cNvPr id="70" name="Rectangle 69">
@@ -7364,7 +8142,7 @@
             <p:spPr>
               <a:xfrm>
                 <a:off x="2155093" y="5780598"/>
-                <a:ext cx="2395464" cy="620298"/>
+                <a:ext cx="2368212" cy="620298"/>
               </a:xfrm>
               <a:prstGeom prst="rect">
                 <a:avLst/>
@@ -7395,6 +8173,2571 @@
     <p:extLst>
       <p:ext uri="{BB962C8B-B14F-4D97-AF65-F5344CB8AC3E}">
         <p14:creationId xmlns:p14="http://schemas.microsoft.com/office/powerpoint/2010/main" val="4263111817"/>
+      </p:ext>
+    </p:extLst>
+  </p:cSld>
+  <p:clrMapOvr>
+    <a:masterClrMapping/>
+  </p:clrMapOvr>
+</p:sld>
+</file>
+
+<file path=ppt/slides/slide5.xml><?xml version="1.0" encoding="utf-8"?>
+<p:sld xmlns:a="http://schemas.openxmlformats.org/drawingml/2006/main" xmlns:r="http://schemas.openxmlformats.org/officeDocument/2006/relationships" xmlns:p="http://schemas.openxmlformats.org/presentationml/2006/main">
+  <p:cSld>
+    <p:spTree>
+      <p:nvGrpSpPr>
+        <p:cNvPr id="1" name=""/>
+        <p:cNvGrpSpPr/>
+        <p:nvPr/>
+      </p:nvGrpSpPr>
+      <p:grpSpPr>
+        <a:xfrm>
+          <a:off x="0" y="0"/>
+          <a:ext cx="0" cy="0"/>
+          <a:chOff x="0" y="0"/>
+          <a:chExt cx="0" cy="0"/>
+        </a:xfrm>
+      </p:grpSpPr>
+      <p:sp>
+        <p:nvSpPr>
+          <p:cNvPr id="2" name="Rectangle 1">
+            <a:extLst>
+              <a:ext uri="{FF2B5EF4-FFF2-40B4-BE49-F238E27FC236}">
+                <a16:creationId xmlns:a16="http://schemas.microsoft.com/office/drawing/2014/main" id="{52822525-5A14-D241-BA07-07D3D8C808D8}"/>
+              </a:ext>
+            </a:extLst>
+          </p:cNvPr>
+          <p:cNvSpPr/>
+          <p:nvPr/>
+        </p:nvSpPr>
+        <p:spPr>
+          <a:xfrm>
+            <a:off x="4267200" y="1600200"/>
+            <a:ext cx="3657600" cy="3657600"/>
+          </a:xfrm>
+          <a:prstGeom prst="rect">
+            <a:avLst/>
+          </a:prstGeom>
+          <a:noFill/>
+          <a:ln w="38100">
+            <a:solidFill>
+              <a:schemeClr val="tx1"/>
+            </a:solidFill>
+          </a:ln>
+        </p:spPr>
+        <p:style>
+          <a:lnRef idx="2">
+            <a:schemeClr val="accent1">
+              <a:shade val="50000"/>
+            </a:schemeClr>
+          </a:lnRef>
+          <a:fillRef idx="1">
+            <a:schemeClr val="accent1"/>
+          </a:fillRef>
+          <a:effectRef idx="0">
+            <a:schemeClr val="accent1"/>
+          </a:effectRef>
+          <a:fontRef idx="minor">
+            <a:schemeClr val="lt1"/>
+          </a:fontRef>
+        </p:style>
+        <p:txBody>
+          <a:bodyPr rtlCol="0" anchor="ctr"/>
+          <a:lstStyle/>
+          <a:p>
+            <a:pPr algn="ctr"/>
+            <a:endParaRPr lang="en-US" dirty="0"/>
+          </a:p>
+        </p:txBody>
+      </p:sp>
+      <p:cxnSp>
+        <p:nvCxnSpPr>
+          <p:cNvPr id="4" name="Straight Connector 3">
+            <a:extLst>
+              <a:ext uri="{FF2B5EF4-FFF2-40B4-BE49-F238E27FC236}">
+                <a16:creationId xmlns:a16="http://schemas.microsoft.com/office/drawing/2014/main" id="{C2196491-AC47-E346-9288-C826E2CB574C}"/>
+              </a:ext>
+            </a:extLst>
+          </p:cNvPr>
+          <p:cNvCxnSpPr/>
+          <p:nvPr/>
+        </p:nvCxnSpPr>
+        <p:spPr>
+          <a:xfrm>
+            <a:off x="2883877" y="3434862"/>
+            <a:ext cx="6424246" cy="0"/>
+          </a:xfrm>
+          <a:prstGeom prst="line">
+            <a:avLst/>
+          </a:prstGeom>
+          <a:ln w="38100">
+            <a:solidFill>
+              <a:schemeClr val="tx1"/>
+            </a:solidFill>
+            <a:headEnd type="triangle"/>
+            <a:tailEnd type="triangle"/>
+          </a:ln>
+        </p:spPr>
+        <p:style>
+          <a:lnRef idx="1">
+            <a:schemeClr val="accent1"/>
+          </a:lnRef>
+          <a:fillRef idx="0">
+            <a:schemeClr val="accent1"/>
+          </a:fillRef>
+          <a:effectRef idx="0">
+            <a:schemeClr val="accent1"/>
+          </a:effectRef>
+          <a:fontRef idx="minor">
+            <a:schemeClr val="tx1"/>
+          </a:fontRef>
+        </p:style>
+      </p:cxnSp>
+      <p:cxnSp>
+        <p:nvCxnSpPr>
+          <p:cNvPr id="9" name="Straight Connector 8">
+            <a:extLst>
+              <a:ext uri="{FF2B5EF4-FFF2-40B4-BE49-F238E27FC236}">
+                <a16:creationId xmlns:a16="http://schemas.microsoft.com/office/drawing/2014/main" id="{8A7DC816-2205-324B-BCC4-3E6BA2232219}"/>
+              </a:ext>
+            </a:extLst>
+          </p:cNvPr>
+          <p:cNvCxnSpPr>
+            <a:cxnSpLocks/>
+          </p:cNvCxnSpPr>
+          <p:nvPr/>
+        </p:nvCxnSpPr>
+        <p:spPr>
+          <a:xfrm>
+            <a:off x="6096000" y="521678"/>
+            <a:ext cx="0" cy="5744308"/>
+          </a:xfrm>
+          <a:prstGeom prst="line">
+            <a:avLst/>
+          </a:prstGeom>
+          <a:ln w="38100">
+            <a:solidFill>
+              <a:schemeClr val="tx1"/>
+            </a:solidFill>
+            <a:headEnd type="triangle"/>
+            <a:tailEnd type="triangle"/>
+          </a:ln>
+        </p:spPr>
+        <p:style>
+          <a:lnRef idx="1">
+            <a:schemeClr val="accent1"/>
+          </a:lnRef>
+          <a:fillRef idx="0">
+            <a:schemeClr val="accent1"/>
+          </a:fillRef>
+          <a:effectRef idx="0">
+            <a:schemeClr val="accent1"/>
+          </a:effectRef>
+          <a:fontRef idx="minor">
+            <a:schemeClr val="tx1"/>
+          </a:fontRef>
+        </p:style>
+      </p:cxnSp>
+      <p:cxnSp>
+        <p:nvCxnSpPr>
+          <p:cNvPr id="14" name="Straight Connector 13">
+            <a:extLst>
+              <a:ext uri="{FF2B5EF4-FFF2-40B4-BE49-F238E27FC236}">
+                <a16:creationId xmlns:a16="http://schemas.microsoft.com/office/drawing/2014/main" id="{9B9EB830-3547-5143-B88B-8002A07B5712}"/>
+              </a:ext>
+            </a:extLst>
+          </p:cNvPr>
+          <p:cNvCxnSpPr>
+            <a:cxnSpLocks/>
+          </p:cNvCxnSpPr>
+          <p:nvPr/>
+        </p:nvCxnSpPr>
+        <p:spPr>
+          <a:xfrm flipH="1">
+            <a:off x="3185691" y="2034009"/>
+            <a:ext cx="5767753" cy="2883877"/>
+          </a:xfrm>
+          <a:prstGeom prst="line">
+            <a:avLst/>
+          </a:prstGeom>
+          <a:ln w="38100">
+            <a:solidFill>
+              <a:srgbClr val="0070C0"/>
+            </a:solidFill>
+            <a:headEnd type="triangle"/>
+            <a:tailEnd type="triangle"/>
+          </a:ln>
+        </p:spPr>
+        <p:style>
+          <a:lnRef idx="1">
+            <a:schemeClr val="accent1"/>
+          </a:lnRef>
+          <a:fillRef idx="0">
+            <a:schemeClr val="accent1"/>
+          </a:fillRef>
+          <a:effectRef idx="0">
+            <a:schemeClr val="accent1"/>
+          </a:effectRef>
+          <a:fontRef idx="minor">
+            <a:schemeClr val="tx1"/>
+          </a:fontRef>
+        </p:style>
+      </p:cxnSp>
+      <p:cxnSp>
+        <p:nvCxnSpPr>
+          <p:cNvPr id="17" name="Straight Connector 16">
+            <a:extLst>
+              <a:ext uri="{FF2B5EF4-FFF2-40B4-BE49-F238E27FC236}">
+                <a16:creationId xmlns:a16="http://schemas.microsoft.com/office/drawing/2014/main" id="{CB085185-FC5E-1449-B616-473CC9233C97}"/>
+              </a:ext>
+            </a:extLst>
+          </p:cNvPr>
+          <p:cNvCxnSpPr>
+            <a:cxnSpLocks/>
+          </p:cNvCxnSpPr>
+          <p:nvPr/>
+        </p:nvCxnSpPr>
+        <p:spPr>
+          <a:xfrm>
+            <a:off x="4851860" y="782516"/>
+            <a:ext cx="2391508" cy="5222632"/>
+          </a:xfrm>
+          <a:prstGeom prst="line">
+            <a:avLst/>
+          </a:prstGeom>
+          <a:ln w="38100">
+            <a:solidFill>
+              <a:srgbClr val="FF0000"/>
+            </a:solidFill>
+            <a:headEnd type="triangle"/>
+            <a:tailEnd type="triangle"/>
+          </a:ln>
+        </p:spPr>
+        <p:style>
+          <a:lnRef idx="1">
+            <a:schemeClr val="accent1"/>
+          </a:lnRef>
+          <a:fillRef idx="0">
+            <a:schemeClr val="accent1"/>
+          </a:fillRef>
+          <a:effectRef idx="0">
+            <a:schemeClr val="accent1"/>
+          </a:effectRef>
+          <a:fontRef idx="minor">
+            <a:schemeClr val="tx1"/>
+          </a:fontRef>
+        </p:style>
+      </p:cxnSp>
+      <p:sp>
+        <p:nvSpPr>
+          <p:cNvPr id="21" name="Arc 20">
+            <a:extLst>
+              <a:ext uri="{FF2B5EF4-FFF2-40B4-BE49-F238E27FC236}">
+                <a16:creationId xmlns:a16="http://schemas.microsoft.com/office/drawing/2014/main" id="{FB5577F9-46F5-064D-8BE1-52A3DE29B8F2}"/>
+              </a:ext>
+            </a:extLst>
+          </p:cNvPr>
+          <p:cNvSpPr/>
+          <p:nvPr/>
+        </p:nvSpPr>
+        <p:spPr>
+          <a:xfrm>
+            <a:off x="6330463" y="3235571"/>
+            <a:ext cx="304784" cy="398584"/>
+          </a:xfrm>
+          <a:prstGeom prst="arc">
+            <a:avLst>
+              <a:gd name="adj1" fmla="val 16200000"/>
+              <a:gd name="adj2" fmla="val 21584422"/>
+            </a:avLst>
+          </a:prstGeom>
+          <a:ln w="38100">
+            <a:solidFill>
+              <a:schemeClr val="tx1"/>
+            </a:solidFill>
+          </a:ln>
+        </p:spPr>
+        <p:style>
+          <a:lnRef idx="1">
+            <a:schemeClr val="accent1"/>
+          </a:lnRef>
+          <a:fillRef idx="0">
+            <a:schemeClr val="accent1"/>
+          </a:fillRef>
+          <a:effectRef idx="0">
+            <a:schemeClr val="accent1"/>
+          </a:effectRef>
+          <a:fontRef idx="minor">
+            <a:schemeClr val="tx1"/>
+          </a:fontRef>
+        </p:style>
+        <p:txBody>
+          <a:bodyPr rtlCol="0" anchor="ctr"/>
+          <a:lstStyle/>
+          <a:p>
+            <a:pPr algn="ctr"/>
+            <a:endParaRPr lang="en-US"/>
+          </a:p>
+        </p:txBody>
+      </p:sp>
+      <mc:AlternateContent xmlns:mc="http://schemas.openxmlformats.org/markup-compatibility/2006" xmlns:a14="http://schemas.microsoft.com/office/drawing/2010/main">
+        <mc:Choice Requires="a14">
+          <p:sp>
+            <p:nvSpPr>
+              <p:cNvPr id="22" name="Rectangle 21">
+                <a:extLst>
+                  <a:ext uri="{FF2B5EF4-FFF2-40B4-BE49-F238E27FC236}">
+                    <a16:creationId xmlns:a16="http://schemas.microsoft.com/office/drawing/2014/main" id="{509E2BA2-10C0-8348-AF2E-93DCBCC7D84A}"/>
+                  </a:ext>
+                </a:extLst>
+              </p:cNvPr>
+              <p:cNvSpPr/>
+              <p:nvPr/>
+            </p:nvSpPr>
+            <p:spPr>
+              <a:xfrm>
+                <a:off x="8245804" y="2034009"/>
+                <a:ext cx="1515038" cy="461665"/>
+              </a:xfrm>
+              <a:prstGeom prst="rect">
+                <a:avLst/>
+              </a:prstGeom>
+            </p:spPr>
+            <p:txBody>
+              <a:bodyPr wrap="square">
+                <a:spAutoFit/>
+              </a:bodyPr>
+              <a:lstStyle/>
+              <a:p>
+                <a:pPr/>
+                <a14:m>
+                  <m:oMathPara xmlns:m="http://schemas.openxmlformats.org/officeDocument/2006/math">
+                    <m:oMathParaPr>
+                      <m:jc m:val="centerGroup"/>
+                    </m:oMathParaPr>
+                    <m:oMath xmlns:m="http://schemas.openxmlformats.org/officeDocument/2006/math">
+                      <m:r>
+                        <a:rPr lang="en-US" sz="2400" i="1">
+                          <a:latin typeface="Cambria Math" panose="02040503050406030204" pitchFamily="18" charset="0"/>
+                        </a:rPr>
+                        <m:t>𝜉</m:t>
+                      </m:r>
+                    </m:oMath>
+                  </m:oMathPara>
+                </a14:m>
+                <a:endParaRPr lang="en-US" sz="2400" dirty="0"/>
+              </a:p>
+            </p:txBody>
+          </p:sp>
+        </mc:Choice>
+        <mc:Fallback xmlns="">
+          <p:sp>
+            <p:nvSpPr>
+              <p:cNvPr id="22" name="Rectangle 21">
+                <a:extLst>
+                  <a:ext uri="{FF2B5EF4-FFF2-40B4-BE49-F238E27FC236}">
+                    <a16:creationId xmlns:a16="http://schemas.microsoft.com/office/drawing/2014/main" id="{509E2BA2-10C0-8348-AF2E-93DCBCC7D84A}"/>
+                  </a:ext>
+                </a:extLst>
+              </p:cNvPr>
+              <p:cNvSpPr>
+                <a:spLocks noRot="1" noChangeAspect="1" noMove="1" noResize="1" noEditPoints="1" noAdjustHandles="1" noChangeArrowheads="1" noChangeShapeType="1" noTextEdit="1"/>
+              </p:cNvSpPr>
+              <p:nvPr/>
+            </p:nvSpPr>
+            <p:spPr>
+              <a:xfrm>
+                <a:off x="8245804" y="2034009"/>
+                <a:ext cx="1515038" cy="461665"/>
+              </a:xfrm>
+              <a:prstGeom prst="rect">
+                <a:avLst/>
+              </a:prstGeom>
+              <a:blipFill>
+                <a:blip r:embed="rId2"/>
+                <a:stretch>
+                  <a:fillRect b="-15789"/>
+                </a:stretch>
+              </a:blipFill>
+            </p:spPr>
+            <p:txBody>
+              <a:bodyPr/>
+              <a:lstStyle/>
+              <a:p>
+                <a:r>
+                  <a:rPr lang="en-US">
+                    <a:noFill/>
+                  </a:rPr>
+                  <a:t> </a:t>
+                </a:r>
+              </a:p>
+            </p:txBody>
+          </p:sp>
+        </mc:Fallback>
+      </mc:AlternateContent>
+      <mc:AlternateContent xmlns:mc="http://schemas.openxmlformats.org/markup-compatibility/2006" xmlns:a14="http://schemas.microsoft.com/office/drawing/2010/main">
+        <mc:Choice Requires="a14">
+          <p:sp>
+            <p:nvSpPr>
+              <p:cNvPr id="23" name="Rectangle 22">
+                <a:extLst>
+                  <a:ext uri="{FF2B5EF4-FFF2-40B4-BE49-F238E27FC236}">
+                    <a16:creationId xmlns:a16="http://schemas.microsoft.com/office/drawing/2014/main" id="{AB73AE0F-1897-1542-89BF-F6C31F4472DE}"/>
+                  </a:ext>
+                </a:extLst>
+              </p:cNvPr>
+              <p:cNvSpPr/>
+              <p:nvPr/>
+            </p:nvSpPr>
+            <p:spPr>
+              <a:xfrm>
+                <a:off x="4831808" y="407348"/>
+                <a:ext cx="424540" cy="461665"/>
+              </a:xfrm>
+              <a:prstGeom prst="rect">
+                <a:avLst/>
+              </a:prstGeom>
+            </p:spPr>
+            <p:txBody>
+              <a:bodyPr wrap="none">
+                <a:spAutoFit/>
+              </a:bodyPr>
+              <a:lstStyle/>
+              <a:p>
+                <a:pPr/>
+                <a14:m>
+                  <m:oMathPara xmlns:m="http://schemas.openxmlformats.org/officeDocument/2006/math">
+                    <m:oMathParaPr>
+                      <m:jc m:val="centerGroup"/>
+                    </m:oMathParaPr>
+                    <m:oMath xmlns:m="http://schemas.openxmlformats.org/officeDocument/2006/math">
+                      <m:r>
+                        <a:rPr lang="en-US" sz="2400" b="0" i="1" smtClean="0">
+                          <a:latin typeface="Cambria Math" panose="02040503050406030204" pitchFamily="18" charset="0"/>
+                        </a:rPr>
+                        <m:t>𝜂</m:t>
+                      </m:r>
+                    </m:oMath>
+                  </m:oMathPara>
+                </a14:m>
+                <a:endParaRPr lang="en-US" sz="2400" dirty="0"/>
+              </a:p>
+            </p:txBody>
+          </p:sp>
+        </mc:Choice>
+        <mc:Fallback xmlns="">
+          <p:sp>
+            <p:nvSpPr>
+              <p:cNvPr id="23" name="Rectangle 22">
+                <a:extLst>
+                  <a:ext uri="{FF2B5EF4-FFF2-40B4-BE49-F238E27FC236}">
+                    <a16:creationId xmlns:a16="http://schemas.microsoft.com/office/drawing/2014/main" id="{AB73AE0F-1897-1542-89BF-F6C31F4472DE}"/>
+                  </a:ext>
+                </a:extLst>
+              </p:cNvPr>
+              <p:cNvSpPr>
+                <a:spLocks noRot="1" noChangeAspect="1" noMove="1" noResize="1" noEditPoints="1" noAdjustHandles="1" noChangeArrowheads="1" noChangeShapeType="1" noTextEdit="1"/>
+              </p:cNvSpPr>
+              <p:nvPr/>
+            </p:nvSpPr>
+            <p:spPr>
+              <a:xfrm>
+                <a:off x="4831808" y="407348"/>
+                <a:ext cx="424540" cy="461665"/>
+              </a:xfrm>
+              <a:prstGeom prst="rect">
+                <a:avLst/>
+              </a:prstGeom>
+              <a:blipFill>
+                <a:blip r:embed="rId3"/>
+                <a:stretch>
+                  <a:fillRect b="-10811"/>
+                </a:stretch>
+              </a:blipFill>
+            </p:spPr>
+            <p:txBody>
+              <a:bodyPr/>
+              <a:lstStyle/>
+              <a:p>
+                <a:r>
+                  <a:rPr lang="en-US">
+                    <a:noFill/>
+                  </a:rPr>
+                  <a:t> </a:t>
+                </a:r>
+              </a:p>
+            </p:txBody>
+          </p:sp>
+        </mc:Fallback>
+      </mc:AlternateContent>
+      <mc:AlternateContent xmlns:mc="http://schemas.openxmlformats.org/markup-compatibility/2006" xmlns:a14="http://schemas.microsoft.com/office/drawing/2010/main">
+        <mc:Choice Requires="a14">
+          <p:sp>
+            <p:nvSpPr>
+              <p:cNvPr id="24" name="Rectangle 23">
+                <a:extLst>
+                  <a:ext uri="{FF2B5EF4-FFF2-40B4-BE49-F238E27FC236}">
+                    <a16:creationId xmlns:a16="http://schemas.microsoft.com/office/drawing/2014/main" id="{8E45276C-85F1-9841-B0BB-4A64FDD67AB5}"/>
+                  </a:ext>
+                </a:extLst>
+              </p:cNvPr>
+              <p:cNvSpPr/>
+              <p:nvPr/>
+            </p:nvSpPr>
+            <p:spPr>
+              <a:xfrm>
+                <a:off x="6700557" y="2981988"/>
+                <a:ext cx="470192" cy="461665"/>
+              </a:xfrm>
+              <a:prstGeom prst="rect">
+                <a:avLst/>
+              </a:prstGeom>
+            </p:spPr>
+            <p:txBody>
+              <a:bodyPr wrap="none">
+                <a:spAutoFit/>
+              </a:bodyPr>
+              <a:lstStyle/>
+              <a:p>
+                <a:pPr/>
+                <a14:m>
+                  <m:oMathPara xmlns:m="http://schemas.openxmlformats.org/officeDocument/2006/math">
+                    <m:oMathParaPr>
+                      <m:jc m:val="centerGroup"/>
+                    </m:oMathParaPr>
+                    <m:oMath xmlns:m="http://schemas.openxmlformats.org/officeDocument/2006/math">
+                      <m:r>
+                        <a:rPr lang="en-US" sz="2400" i="1">
+                          <a:latin typeface="Cambria Math" panose="02040503050406030204" pitchFamily="18" charset="0"/>
+                        </a:rPr>
+                        <m:t>𝜙</m:t>
+                      </m:r>
+                    </m:oMath>
+                  </m:oMathPara>
+                </a14:m>
+                <a:endParaRPr lang="en-US" sz="2400" dirty="0"/>
+              </a:p>
+            </p:txBody>
+          </p:sp>
+        </mc:Choice>
+        <mc:Fallback xmlns="">
+          <p:sp>
+            <p:nvSpPr>
+              <p:cNvPr id="24" name="Rectangle 23">
+                <a:extLst>
+                  <a:ext uri="{FF2B5EF4-FFF2-40B4-BE49-F238E27FC236}">
+                    <a16:creationId xmlns:a16="http://schemas.microsoft.com/office/drawing/2014/main" id="{8E45276C-85F1-9841-B0BB-4A64FDD67AB5}"/>
+                  </a:ext>
+                </a:extLst>
+              </p:cNvPr>
+              <p:cNvSpPr>
+                <a:spLocks noRot="1" noChangeAspect="1" noMove="1" noResize="1" noEditPoints="1" noAdjustHandles="1" noChangeArrowheads="1" noChangeShapeType="1" noTextEdit="1"/>
+              </p:cNvSpPr>
+              <p:nvPr/>
+            </p:nvSpPr>
+            <p:spPr>
+              <a:xfrm>
+                <a:off x="6700557" y="2981988"/>
+                <a:ext cx="470192" cy="461665"/>
+              </a:xfrm>
+              <a:prstGeom prst="rect">
+                <a:avLst/>
+              </a:prstGeom>
+              <a:blipFill>
+                <a:blip r:embed="rId4"/>
+                <a:stretch>
+                  <a:fillRect l="-2703" b="-13514"/>
+                </a:stretch>
+              </a:blipFill>
+            </p:spPr>
+            <p:txBody>
+              <a:bodyPr/>
+              <a:lstStyle/>
+              <a:p>
+                <a:r>
+                  <a:rPr lang="en-US">
+                    <a:noFill/>
+                  </a:rPr>
+                  <a:t> </a:t>
+                </a:r>
+              </a:p>
+            </p:txBody>
+          </p:sp>
+        </mc:Fallback>
+      </mc:AlternateContent>
+      <mc:AlternateContent xmlns:mc="http://schemas.openxmlformats.org/markup-compatibility/2006" xmlns:a14="http://schemas.microsoft.com/office/drawing/2010/main">
+        <mc:Choice Requires="a14">
+          <p:sp>
+            <p:nvSpPr>
+              <p:cNvPr id="25" name="Rectangle 24">
+                <a:extLst>
+                  <a:ext uri="{FF2B5EF4-FFF2-40B4-BE49-F238E27FC236}">
+                    <a16:creationId xmlns:a16="http://schemas.microsoft.com/office/drawing/2014/main" id="{80BE4EEA-8B8C-E247-BB28-381042687028}"/>
+                  </a:ext>
+                </a:extLst>
+              </p:cNvPr>
+              <p:cNvSpPr/>
+              <p:nvPr/>
+            </p:nvSpPr>
+            <p:spPr>
+              <a:xfrm>
+                <a:off x="8865633" y="3411418"/>
+                <a:ext cx="426399" cy="461665"/>
+              </a:xfrm>
+              <a:prstGeom prst="rect">
+                <a:avLst/>
+              </a:prstGeom>
+            </p:spPr>
+            <p:txBody>
+              <a:bodyPr wrap="none">
+                <a:spAutoFit/>
+              </a:bodyPr>
+              <a:lstStyle/>
+              <a:p>
+                <a:pPr/>
+                <a14:m>
+                  <m:oMathPara xmlns:m="http://schemas.openxmlformats.org/officeDocument/2006/math">
+                    <m:oMathParaPr>
+                      <m:jc m:val="centerGroup"/>
+                    </m:oMathParaPr>
+                    <m:oMath xmlns:m="http://schemas.openxmlformats.org/officeDocument/2006/math">
+                      <m:r>
+                        <a:rPr lang="en-US" sz="2400" i="1" smtClean="0">
+                          <a:latin typeface="Cambria Math" panose="02040503050406030204" pitchFamily="18" charset="0"/>
+                        </a:rPr>
+                        <m:t>𝑥</m:t>
+                      </m:r>
+                    </m:oMath>
+                  </m:oMathPara>
+                </a14:m>
+                <a:endParaRPr lang="en-US" sz="2400" dirty="0"/>
+              </a:p>
+            </p:txBody>
+          </p:sp>
+        </mc:Choice>
+        <mc:Fallback xmlns="">
+          <p:sp>
+            <p:nvSpPr>
+              <p:cNvPr id="25" name="Rectangle 24">
+                <a:extLst>
+                  <a:ext uri="{FF2B5EF4-FFF2-40B4-BE49-F238E27FC236}">
+                    <a16:creationId xmlns:a16="http://schemas.microsoft.com/office/drawing/2014/main" id="{80BE4EEA-8B8C-E247-BB28-381042687028}"/>
+                  </a:ext>
+                </a:extLst>
+              </p:cNvPr>
+              <p:cNvSpPr>
+                <a:spLocks noRot="1" noChangeAspect="1" noMove="1" noResize="1" noEditPoints="1" noAdjustHandles="1" noChangeArrowheads="1" noChangeShapeType="1" noTextEdit="1"/>
+              </p:cNvSpPr>
+              <p:nvPr/>
+            </p:nvSpPr>
+            <p:spPr>
+              <a:xfrm>
+                <a:off x="8865633" y="3411418"/>
+                <a:ext cx="426399" cy="461665"/>
+              </a:xfrm>
+              <a:prstGeom prst="rect">
+                <a:avLst/>
+              </a:prstGeom>
+              <a:blipFill>
+                <a:blip r:embed="rId5"/>
+                <a:stretch>
+                  <a:fillRect/>
+                </a:stretch>
+              </a:blipFill>
+            </p:spPr>
+            <p:txBody>
+              <a:bodyPr/>
+              <a:lstStyle/>
+              <a:p>
+                <a:r>
+                  <a:rPr lang="en-US">
+                    <a:noFill/>
+                  </a:rPr>
+                  <a:t> </a:t>
+                </a:r>
+              </a:p>
+            </p:txBody>
+          </p:sp>
+        </mc:Fallback>
+      </mc:AlternateContent>
+      <mc:AlternateContent xmlns:mc="http://schemas.openxmlformats.org/markup-compatibility/2006" xmlns:a14="http://schemas.microsoft.com/office/drawing/2010/main">
+        <mc:Choice Requires="a14">
+          <p:sp>
+            <p:nvSpPr>
+              <p:cNvPr id="26" name="Rectangle 25">
+                <a:extLst>
+                  <a:ext uri="{FF2B5EF4-FFF2-40B4-BE49-F238E27FC236}">
+                    <a16:creationId xmlns:a16="http://schemas.microsoft.com/office/drawing/2014/main" id="{B677B6E3-45A2-5947-95C6-5DCD79C2E551}"/>
+                  </a:ext>
+                </a:extLst>
+              </p:cNvPr>
+              <p:cNvSpPr/>
+              <p:nvPr/>
+            </p:nvSpPr>
+            <p:spPr>
+              <a:xfrm>
+                <a:off x="6137547" y="519445"/>
+                <a:ext cx="497700" cy="461665"/>
+              </a:xfrm>
+              <a:prstGeom prst="rect">
+                <a:avLst/>
+              </a:prstGeom>
+            </p:spPr>
+            <p:txBody>
+              <a:bodyPr wrap="none">
+                <a:spAutoFit/>
+              </a:bodyPr>
+              <a:lstStyle/>
+              <a:p>
+                <a:pPr/>
+                <a14:m>
+                  <m:oMathPara xmlns:m="http://schemas.openxmlformats.org/officeDocument/2006/math">
+                    <m:oMathParaPr>
+                      <m:jc m:val="centerGroup"/>
+                    </m:oMathParaPr>
+                    <m:oMath xmlns:m="http://schemas.openxmlformats.org/officeDocument/2006/math">
+                      <m:r>
+                        <a:rPr lang="en-US" sz="2400" i="1">
+                          <a:latin typeface="Cambria Math" panose="02040503050406030204" pitchFamily="18" charset="0"/>
+                        </a:rPr>
+                        <m:t>𝑦</m:t>
+                      </m:r>
+                      <m:r>
+                        <a:rPr lang="en-US" sz="2400" i="0">
+                          <a:latin typeface="Cambria Math" panose="02040503050406030204" pitchFamily="18" charset="0"/>
+                        </a:rPr>
+                        <m:t> </m:t>
+                      </m:r>
+                    </m:oMath>
+                  </m:oMathPara>
+                </a14:m>
+                <a:endParaRPr lang="en-US" sz="2400" dirty="0"/>
+              </a:p>
+            </p:txBody>
+          </p:sp>
+        </mc:Choice>
+        <mc:Fallback xmlns="">
+          <p:sp>
+            <p:nvSpPr>
+              <p:cNvPr id="26" name="Rectangle 25">
+                <a:extLst>
+                  <a:ext uri="{FF2B5EF4-FFF2-40B4-BE49-F238E27FC236}">
+                    <a16:creationId xmlns:a16="http://schemas.microsoft.com/office/drawing/2014/main" id="{B677B6E3-45A2-5947-95C6-5DCD79C2E551}"/>
+                  </a:ext>
+                </a:extLst>
+              </p:cNvPr>
+              <p:cNvSpPr>
+                <a:spLocks noRot="1" noChangeAspect="1" noMove="1" noResize="1" noEditPoints="1" noAdjustHandles="1" noChangeArrowheads="1" noChangeShapeType="1" noTextEdit="1"/>
+              </p:cNvSpPr>
+              <p:nvPr/>
+            </p:nvSpPr>
+            <p:spPr>
+              <a:xfrm>
+                <a:off x="6137547" y="519445"/>
+                <a:ext cx="497700" cy="461665"/>
+              </a:xfrm>
+              <a:prstGeom prst="rect">
+                <a:avLst/>
+              </a:prstGeom>
+              <a:blipFill>
+                <a:blip r:embed="rId6"/>
+                <a:stretch>
+                  <a:fillRect r="-5000" b="-18919"/>
+                </a:stretch>
+              </a:blipFill>
+            </p:spPr>
+            <p:txBody>
+              <a:bodyPr/>
+              <a:lstStyle/>
+              <a:p>
+                <a:r>
+                  <a:rPr lang="en-US">
+                    <a:noFill/>
+                  </a:rPr>
+                  <a:t> </a:t>
+                </a:r>
+              </a:p>
+            </p:txBody>
+          </p:sp>
+        </mc:Fallback>
+      </mc:AlternateContent>
+      <p:cxnSp>
+        <p:nvCxnSpPr>
+          <p:cNvPr id="28" name="Straight Connector 27">
+            <a:extLst>
+              <a:ext uri="{FF2B5EF4-FFF2-40B4-BE49-F238E27FC236}">
+                <a16:creationId xmlns:a16="http://schemas.microsoft.com/office/drawing/2014/main" id="{B23EC1A3-96CB-6343-AAA0-F45B399B4375}"/>
+              </a:ext>
+            </a:extLst>
+          </p:cNvPr>
+          <p:cNvCxnSpPr>
+            <a:cxnSpLocks/>
+          </p:cNvCxnSpPr>
+          <p:nvPr/>
+        </p:nvCxnSpPr>
+        <p:spPr>
+          <a:xfrm>
+            <a:off x="3468536" y="1044848"/>
+            <a:ext cx="2157047" cy="4733140"/>
+          </a:xfrm>
+          <a:prstGeom prst="line">
+            <a:avLst/>
+          </a:prstGeom>
+          <a:ln w="38100">
+            <a:solidFill>
+              <a:srgbClr val="7030A0"/>
+            </a:solidFill>
+            <a:tailEnd type="triangle"/>
+          </a:ln>
+        </p:spPr>
+        <p:style>
+          <a:lnRef idx="1">
+            <a:schemeClr val="accent1"/>
+          </a:lnRef>
+          <a:fillRef idx="0">
+            <a:schemeClr val="accent1"/>
+          </a:fillRef>
+          <a:effectRef idx="0">
+            <a:schemeClr val="accent1"/>
+          </a:effectRef>
+          <a:fontRef idx="minor">
+            <a:schemeClr val="tx1"/>
+          </a:fontRef>
+        </p:style>
+      </p:cxnSp>
+      <mc:AlternateContent xmlns:mc="http://schemas.openxmlformats.org/markup-compatibility/2006" xmlns:a14="http://schemas.microsoft.com/office/drawing/2010/main">
+        <mc:Choice Requires="a14">
+          <p:sp>
+            <p:nvSpPr>
+              <p:cNvPr id="30" name="Rectangle 29">
+                <a:extLst>
+                  <a:ext uri="{FF2B5EF4-FFF2-40B4-BE49-F238E27FC236}">
+                    <a16:creationId xmlns:a16="http://schemas.microsoft.com/office/drawing/2014/main" id="{589C4227-F8EA-104D-BBE7-0D5F369BC7F8}"/>
+                  </a:ext>
+                </a:extLst>
+              </p:cNvPr>
+              <p:cNvSpPr/>
+              <p:nvPr/>
+            </p:nvSpPr>
+            <p:spPr>
+              <a:xfrm>
+                <a:off x="4532273" y="4143218"/>
+                <a:ext cx="535083" cy="461665"/>
+              </a:xfrm>
+              <a:prstGeom prst="rect">
+                <a:avLst/>
+              </a:prstGeom>
+            </p:spPr>
+            <p:txBody>
+              <a:bodyPr wrap="none">
+                <a:spAutoFit/>
+              </a:bodyPr>
+              <a:lstStyle/>
+              <a:p>
+                <a:pPr/>
+                <a14:m>
+                  <m:oMathPara xmlns:m="http://schemas.openxmlformats.org/officeDocument/2006/math">
+                    <m:oMathParaPr>
+                      <m:jc m:val="centerGroup"/>
+                    </m:oMathParaPr>
+                    <m:oMath xmlns:m="http://schemas.openxmlformats.org/officeDocument/2006/math">
+                      <m:sSub>
+                        <m:sSubPr>
+                          <m:ctrlPr>
+                            <a:rPr lang="en-US" sz="2400" i="1">
+                              <a:latin typeface="Cambria Math" panose="02040503050406030204" pitchFamily="18" charset="0"/>
+                            </a:rPr>
+                          </m:ctrlPr>
+                        </m:sSubPr>
+                        <m:e>
+                          <m:r>
+                            <a:rPr lang="en-US" sz="2400" i="1">
+                              <a:latin typeface="Cambria Math" panose="02040503050406030204" pitchFamily="18" charset="0"/>
+                            </a:rPr>
+                            <m:t>𝜉</m:t>
+                          </m:r>
+                        </m:e>
+                        <m:sub>
+                          <m:r>
+                            <a:rPr lang="en-US" sz="2400" i="0">
+                              <a:latin typeface="Cambria Math" panose="02040503050406030204" pitchFamily="18" charset="0"/>
+                            </a:rPr>
+                            <m:t>0</m:t>
+                          </m:r>
+                        </m:sub>
+                      </m:sSub>
+                    </m:oMath>
+                  </m:oMathPara>
+                </a14:m>
+                <a:endParaRPr lang="en-US" sz="2400" dirty="0"/>
+              </a:p>
+            </p:txBody>
+          </p:sp>
+        </mc:Choice>
+        <mc:Fallback xmlns="">
+          <p:sp>
+            <p:nvSpPr>
+              <p:cNvPr id="30" name="Rectangle 29">
+                <a:extLst>
+                  <a:ext uri="{FF2B5EF4-FFF2-40B4-BE49-F238E27FC236}">
+                    <a16:creationId xmlns:a16="http://schemas.microsoft.com/office/drawing/2014/main" id="{589C4227-F8EA-104D-BBE7-0D5F369BC7F8}"/>
+                  </a:ext>
+                </a:extLst>
+              </p:cNvPr>
+              <p:cNvSpPr>
+                <a:spLocks noRot="1" noChangeAspect="1" noMove="1" noResize="1" noEditPoints="1" noAdjustHandles="1" noChangeArrowheads="1" noChangeShapeType="1" noTextEdit="1"/>
+              </p:cNvSpPr>
+              <p:nvPr/>
+            </p:nvSpPr>
+            <p:spPr>
+              <a:xfrm>
+                <a:off x="4532273" y="4143218"/>
+                <a:ext cx="535083" cy="461665"/>
+              </a:xfrm>
+              <a:prstGeom prst="rect">
+                <a:avLst/>
+              </a:prstGeom>
+              <a:blipFill>
+                <a:blip r:embed="rId7"/>
+                <a:stretch>
+                  <a:fillRect l="-2326" b="-15789"/>
+                </a:stretch>
+              </a:blipFill>
+            </p:spPr>
+            <p:txBody>
+              <a:bodyPr/>
+              <a:lstStyle/>
+              <a:p>
+                <a:r>
+                  <a:rPr lang="en-US">
+                    <a:noFill/>
+                  </a:rPr>
+                  <a:t> </a:t>
+                </a:r>
+              </a:p>
+            </p:txBody>
+          </p:sp>
+        </mc:Fallback>
+      </mc:AlternateContent>
+      <mc:AlternateContent xmlns:mc="http://schemas.openxmlformats.org/markup-compatibility/2006" xmlns:a14="http://schemas.microsoft.com/office/drawing/2010/main">
+        <mc:Choice Requires="a14">
+          <p:sp>
+            <p:nvSpPr>
+              <p:cNvPr id="31" name="Rectangle 30">
+                <a:extLst>
+                  <a:ext uri="{FF2B5EF4-FFF2-40B4-BE49-F238E27FC236}">
+                    <a16:creationId xmlns:a16="http://schemas.microsoft.com/office/drawing/2014/main" id="{95C2CD4D-EA71-2746-B20F-0272862F1127}"/>
+                  </a:ext>
+                </a:extLst>
+              </p:cNvPr>
+              <p:cNvSpPr/>
+              <p:nvPr/>
+            </p:nvSpPr>
+            <p:spPr>
+              <a:xfrm>
+                <a:off x="3212316" y="1174604"/>
+                <a:ext cx="429348" cy="461665"/>
+              </a:xfrm>
+              <a:prstGeom prst="rect">
+                <a:avLst/>
+              </a:prstGeom>
+            </p:spPr>
+            <p:txBody>
+              <a:bodyPr wrap="none">
+                <a:spAutoFit/>
+              </a:bodyPr>
+              <a:lstStyle/>
+              <a:p>
+                <a:pPr/>
+                <a14:m>
+                  <m:oMathPara xmlns:m="http://schemas.openxmlformats.org/officeDocument/2006/math">
+                    <m:oMathParaPr>
+                      <m:jc m:val="centerGroup"/>
+                    </m:oMathParaPr>
+                    <m:oMath xmlns:m="http://schemas.openxmlformats.org/officeDocument/2006/math">
+                      <m:acc>
+                        <m:accPr>
+                          <m:chr m:val="⃗"/>
+                          <m:ctrlPr>
+                            <a:rPr lang="en-US" sz="2400" i="1">
+                              <a:latin typeface="Cambria Math" panose="02040503050406030204" pitchFamily="18" charset="0"/>
+                            </a:rPr>
+                          </m:ctrlPr>
+                        </m:accPr>
+                        <m:e>
+                          <m:r>
+                            <a:rPr lang="en-US" sz="2400" i="1">
+                              <a:latin typeface="Cambria Math" panose="02040503050406030204" pitchFamily="18" charset="0"/>
+                            </a:rPr>
+                            <m:t>𝑣</m:t>
+                          </m:r>
+                        </m:e>
+                      </m:acc>
+                    </m:oMath>
+                  </m:oMathPara>
+                </a14:m>
+                <a:endParaRPr lang="en-US" sz="2400" dirty="0"/>
+              </a:p>
+            </p:txBody>
+          </p:sp>
+        </mc:Choice>
+        <mc:Fallback xmlns="">
+          <p:sp>
+            <p:nvSpPr>
+              <p:cNvPr id="31" name="Rectangle 30">
+                <a:extLst>
+                  <a:ext uri="{FF2B5EF4-FFF2-40B4-BE49-F238E27FC236}">
+                    <a16:creationId xmlns:a16="http://schemas.microsoft.com/office/drawing/2014/main" id="{95C2CD4D-EA71-2746-B20F-0272862F1127}"/>
+                  </a:ext>
+                </a:extLst>
+              </p:cNvPr>
+              <p:cNvSpPr>
+                <a:spLocks noRot="1" noChangeAspect="1" noMove="1" noResize="1" noEditPoints="1" noAdjustHandles="1" noChangeArrowheads="1" noChangeShapeType="1" noTextEdit="1"/>
+              </p:cNvSpPr>
+              <p:nvPr/>
+            </p:nvSpPr>
+            <p:spPr>
+              <a:xfrm>
+                <a:off x="3212316" y="1174604"/>
+                <a:ext cx="429348" cy="461665"/>
+              </a:xfrm>
+              <a:prstGeom prst="rect">
+                <a:avLst/>
+              </a:prstGeom>
+              <a:blipFill>
+                <a:blip r:embed="rId8"/>
+                <a:stretch>
+                  <a:fillRect t="-18421"/>
+                </a:stretch>
+              </a:blipFill>
+            </p:spPr>
+            <p:txBody>
+              <a:bodyPr/>
+              <a:lstStyle/>
+              <a:p>
+                <a:r>
+                  <a:rPr lang="en-US">
+                    <a:noFill/>
+                  </a:rPr>
+                  <a:t> </a:t>
+                </a:r>
+              </a:p>
+            </p:txBody>
+          </p:sp>
+        </mc:Fallback>
+      </mc:AlternateContent>
+    </p:spTree>
+    <p:extLst>
+      <p:ext uri="{BB962C8B-B14F-4D97-AF65-F5344CB8AC3E}">
+        <p14:creationId xmlns:p14="http://schemas.microsoft.com/office/powerpoint/2010/main" val="3684091351"/>
+      </p:ext>
+    </p:extLst>
+  </p:cSld>
+  <p:clrMapOvr>
+    <a:masterClrMapping/>
+  </p:clrMapOvr>
+</p:sld>
+</file>
+
+<file path=ppt/slides/slide6.xml><?xml version="1.0" encoding="utf-8"?>
+<p:sld xmlns:a="http://schemas.openxmlformats.org/drawingml/2006/main" xmlns:r="http://schemas.openxmlformats.org/officeDocument/2006/relationships" xmlns:p="http://schemas.openxmlformats.org/presentationml/2006/main">
+  <p:cSld>
+    <p:spTree>
+      <p:nvGrpSpPr>
+        <p:cNvPr id="1" name=""/>
+        <p:cNvGrpSpPr/>
+        <p:nvPr/>
+      </p:nvGrpSpPr>
+      <p:grpSpPr>
+        <a:xfrm>
+          <a:off x="0" y="0"/>
+          <a:ext cx="0" cy="0"/>
+          <a:chOff x="0" y="0"/>
+          <a:chExt cx="0" cy="0"/>
+        </a:xfrm>
+      </p:grpSpPr>
+      <p:pic>
+        <p:nvPicPr>
+          <p:cNvPr id="3" name="Picture 2">
+            <a:extLst>
+              <a:ext uri="{FF2B5EF4-FFF2-40B4-BE49-F238E27FC236}">
+                <a16:creationId xmlns:a16="http://schemas.microsoft.com/office/drawing/2014/main" id="{451F24BB-F21C-3343-8C55-3E6E946DC9CC}"/>
+              </a:ext>
+            </a:extLst>
+          </p:cNvPr>
+          <p:cNvPicPr>
+            <a:picLocks noChangeAspect="1"/>
+          </p:cNvPicPr>
+          <p:nvPr/>
+        </p:nvPicPr>
+        <p:blipFill>
+          <a:blip r:embed="rId2"/>
+          <a:stretch>
+            <a:fillRect/>
+          </a:stretch>
+        </p:blipFill>
+        <p:spPr>
+          <a:xfrm>
+            <a:off x="963386" y="7257"/>
+            <a:ext cx="10080170" cy="6720114"/>
+          </a:xfrm>
+          <a:prstGeom prst="rect">
+            <a:avLst/>
+          </a:prstGeom>
+        </p:spPr>
+      </p:pic>
+      <mc:AlternateContent xmlns:mc="http://schemas.openxmlformats.org/markup-compatibility/2006">
+        <mc:Choice xmlns:a14="http://schemas.microsoft.com/office/drawing/2010/main" Requires="a14">
+          <p:sp>
+            <p:nvSpPr>
+              <p:cNvPr id="4" name="Rectangle 3">
+                <a:extLst>
+                  <a:ext uri="{FF2B5EF4-FFF2-40B4-BE49-F238E27FC236}">
+                    <a16:creationId xmlns:a16="http://schemas.microsoft.com/office/drawing/2014/main" id="{DE009D3F-DBBC-CD4F-B69C-5A66A2A545C7}"/>
+                  </a:ext>
+                </a:extLst>
+              </p:cNvPr>
+              <p:cNvSpPr/>
+              <p:nvPr/>
+            </p:nvSpPr>
+            <p:spPr>
+              <a:xfrm rot="860350">
+                <a:off x="4273562" y="5584649"/>
+                <a:ext cx="920445" cy="461665"/>
+              </a:xfrm>
+              <a:prstGeom prst="rect">
+                <a:avLst/>
+              </a:prstGeom>
+            </p:spPr>
+            <p:txBody>
+              <a:bodyPr wrap="none">
+                <a:spAutoFit/>
+              </a:bodyPr>
+              <a:lstStyle/>
+              <a:p>
+                <a14:m>
+                  <m:oMath xmlns:m="http://schemas.openxmlformats.org/officeDocument/2006/math">
+                    <m:r>
+                      <a:rPr lang="en-US" sz="2400" i="1">
+                        <a:latin typeface="Cambria Math" panose="02040503050406030204" pitchFamily="18" charset="0"/>
+                      </a:rPr>
+                      <m:t>𝑥</m:t>
+                    </m:r>
+                  </m:oMath>
+                </a14:m>
+                <a:r>
+                  <a:rPr lang="en-US" sz="2400" dirty="0"/>
+                  <a:t>-axis</a:t>
+                </a:r>
+              </a:p>
+            </p:txBody>
+          </p:sp>
+        </mc:Choice>
+        <mc:Fallback>
+          <p:sp>
+            <p:nvSpPr>
+              <p:cNvPr id="4" name="Rectangle 3">
+                <a:extLst>
+                  <a:ext uri="{FF2B5EF4-FFF2-40B4-BE49-F238E27FC236}">
+                    <a16:creationId xmlns:a16="http://schemas.microsoft.com/office/drawing/2014/main" id="{DE009D3F-DBBC-CD4F-B69C-5A66A2A545C7}"/>
+                  </a:ext>
+                </a:extLst>
+              </p:cNvPr>
+              <p:cNvSpPr>
+                <a:spLocks noRot="1" noChangeAspect="1" noMove="1" noResize="1" noEditPoints="1" noAdjustHandles="1" noChangeArrowheads="1" noChangeShapeType="1" noTextEdit="1"/>
+              </p:cNvSpPr>
+              <p:nvPr/>
+            </p:nvSpPr>
+            <p:spPr>
+              <a:xfrm rot="860350">
+                <a:off x="4273562" y="5584649"/>
+                <a:ext cx="920445" cy="461665"/>
+              </a:xfrm>
+              <a:prstGeom prst="rect">
+                <a:avLst/>
+              </a:prstGeom>
+              <a:blipFill>
+                <a:blip r:embed="rId3"/>
+                <a:stretch>
+                  <a:fillRect t="-1887" r="-8861" b="-22642"/>
+                </a:stretch>
+              </a:blipFill>
+            </p:spPr>
+            <p:txBody>
+              <a:bodyPr/>
+              <a:lstStyle/>
+              <a:p>
+                <a:r>
+                  <a:rPr lang="en-US">
+                    <a:noFill/>
+                  </a:rPr>
+                  <a:t> </a:t>
+                </a:r>
+              </a:p>
+            </p:txBody>
+          </p:sp>
+        </mc:Fallback>
+      </mc:AlternateContent>
+      <mc:AlternateContent xmlns:mc="http://schemas.openxmlformats.org/markup-compatibility/2006">
+        <mc:Choice xmlns:a14="http://schemas.microsoft.com/office/drawing/2010/main" Requires="a14">
+          <p:sp>
+            <p:nvSpPr>
+              <p:cNvPr id="5" name="Rectangle 4">
+                <a:extLst>
+                  <a:ext uri="{FF2B5EF4-FFF2-40B4-BE49-F238E27FC236}">
+                    <a16:creationId xmlns:a16="http://schemas.microsoft.com/office/drawing/2014/main" id="{F5A48CBE-C34E-EA49-9E4A-E99943DBDB6F}"/>
+                  </a:ext>
+                </a:extLst>
+              </p:cNvPr>
+              <p:cNvSpPr/>
+              <p:nvPr/>
+            </p:nvSpPr>
+            <p:spPr>
+              <a:xfrm rot="18997839">
+                <a:off x="8437592" y="5196478"/>
+                <a:ext cx="924420" cy="461665"/>
+              </a:xfrm>
+              <a:prstGeom prst="rect">
+                <a:avLst/>
+              </a:prstGeom>
+            </p:spPr>
+            <p:txBody>
+              <a:bodyPr wrap="none">
+                <a:spAutoFit/>
+              </a:bodyPr>
+              <a:lstStyle/>
+              <a:p>
+                <a14:m>
+                  <m:oMath xmlns:m="http://schemas.openxmlformats.org/officeDocument/2006/math">
+                    <m:r>
+                      <a:rPr lang="en-US" sz="2400" b="0" i="1" smtClean="0">
+                        <a:latin typeface="Cambria Math" panose="02040503050406030204" pitchFamily="18" charset="0"/>
+                      </a:rPr>
+                      <m:t>𝑦</m:t>
+                    </m:r>
+                  </m:oMath>
+                </a14:m>
+                <a:r>
+                  <a:rPr lang="en-US" sz="2400" dirty="0"/>
+                  <a:t>-axis</a:t>
+                </a:r>
+              </a:p>
+            </p:txBody>
+          </p:sp>
+        </mc:Choice>
+        <mc:Fallback>
+          <p:sp>
+            <p:nvSpPr>
+              <p:cNvPr id="5" name="Rectangle 4">
+                <a:extLst>
+                  <a:ext uri="{FF2B5EF4-FFF2-40B4-BE49-F238E27FC236}">
+                    <a16:creationId xmlns:a16="http://schemas.microsoft.com/office/drawing/2014/main" id="{F5A48CBE-C34E-EA49-9E4A-E99943DBDB6F}"/>
+                  </a:ext>
+                </a:extLst>
+              </p:cNvPr>
+              <p:cNvSpPr>
+                <a:spLocks noRot="1" noChangeAspect="1" noMove="1" noResize="1" noEditPoints="1" noAdjustHandles="1" noChangeArrowheads="1" noChangeShapeType="1" noTextEdit="1"/>
+              </p:cNvSpPr>
+              <p:nvPr/>
+            </p:nvSpPr>
+            <p:spPr>
+              <a:xfrm rot="18997839">
+                <a:off x="8437592" y="5196478"/>
+                <a:ext cx="924420" cy="461665"/>
+              </a:xfrm>
+              <a:prstGeom prst="rect">
+                <a:avLst/>
+              </a:prstGeom>
+              <a:blipFill>
+                <a:blip r:embed="rId4"/>
+                <a:stretch>
+                  <a:fillRect t="-7792" r="-15190" b="-3896"/>
+                </a:stretch>
+              </a:blipFill>
+            </p:spPr>
+            <p:txBody>
+              <a:bodyPr/>
+              <a:lstStyle/>
+              <a:p>
+                <a:r>
+                  <a:rPr lang="en-US">
+                    <a:noFill/>
+                  </a:rPr>
+                  <a:t> </a:t>
+                </a:r>
+              </a:p>
+            </p:txBody>
+          </p:sp>
+        </mc:Fallback>
+      </mc:AlternateContent>
+      <mc:AlternateContent xmlns:mc="http://schemas.openxmlformats.org/markup-compatibility/2006">
+        <mc:Choice xmlns:a14="http://schemas.microsoft.com/office/drawing/2010/main" Requires="a14">
+          <p:sp>
+            <p:nvSpPr>
+              <p:cNvPr id="6" name="Rectangle 5">
+                <a:extLst>
+                  <a:ext uri="{FF2B5EF4-FFF2-40B4-BE49-F238E27FC236}">
+                    <a16:creationId xmlns:a16="http://schemas.microsoft.com/office/drawing/2014/main" id="{7D25E0E8-1447-B24F-AEE4-8F11B878E16C}"/>
+                  </a:ext>
+                </a:extLst>
+              </p:cNvPr>
+              <p:cNvSpPr/>
+              <p:nvPr/>
+            </p:nvSpPr>
+            <p:spPr>
+              <a:xfrm>
+                <a:off x="9810867" y="3244334"/>
+                <a:ext cx="901978" cy="461665"/>
+              </a:xfrm>
+              <a:prstGeom prst="rect">
+                <a:avLst/>
+              </a:prstGeom>
+            </p:spPr>
+            <p:txBody>
+              <a:bodyPr wrap="none">
+                <a:spAutoFit/>
+              </a:bodyPr>
+              <a:lstStyle/>
+              <a:p>
+                <a14:m>
+                  <m:oMath xmlns:m="http://schemas.openxmlformats.org/officeDocument/2006/math">
+                    <m:r>
+                      <a:rPr lang="en-US" sz="2400" b="0" i="1" smtClean="0">
+                        <a:latin typeface="Cambria Math" panose="02040503050406030204" pitchFamily="18" charset="0"/>
+                      </a:rPr>
+                      <m:t>𝑧</m:t>
+                    </m:r>
+                  </m:oMath>
+                </a14:m>
+                <a:r>
+                  <a:rPr lang="en-US" sz="2400" dirty="0"/>
+                  <a:t>-axis</a:t>
+                </a:r>
+              </a:p>
+            </p:txBody>
+          </p:sp>
+        </mc:Choice>
+        <mc:Fallback>
+          <p:sp>
+            <p:nvSpPr>
+              <p:cNvPr id="6" name="Rectangle 5">
+                <a:extLst>
+                  <a:ext uri="{FF2B5EF4-FFF2-40B4-BE49-F238E27FC236}">
+                    <a16:creationId xmlns:a16="http://schemas.microsoft.com/office/drawing/2014/main" id="{7D25E0E8-1447-B24F-AEE4-8F11B878E16C}"/>
+                  </a:ext>
+                </a:extLst>
+              </p:cNvPr>
+              <p:cNvSpPr>
+                <a:spLocks noRot="1" noChangeAspect="1" noMove="1" noResize="1" noEditPoints="1" noAdjustHandles="1" noChangeArrowheads="1" noChangeShapeType="1" noTextEdit="1"/>
+              </p:cNvSpPr>
+              <p:nvPr/>
+            </p:nvSpPr>
+            <p:spPr>
+              <a:xfrm>
+                <a:off x="9810867" y="3244334"/>
+                <a:ext cx="901978" cy="461665"/>
+              </a:xfrm>
+              <a:prstGeom prst="rect">
+                <a:avLst/>
+              </a:prstGeom>
+              <a:blipFill>
+                <a:blip r:embed="rId5"/>
+                <a:stretch>
+                  <a:fillRect t="-5263" r="-8333" b="-26316"/>
+                </a:stretch>
+              </a:blipFill>
+            </p:spPr>
+            <p:txBody>
+              <a:bodyPr/>
+              <a:lstStyle/>
+              <a:p>
+                <a:r>
+                  <a:rPr lang="en-US">
+                    <a:noFill/>
+                  </a:rPr>
+                  <a:t> </a:t>
+                </a:r>
+              </a:p>
+            </p:txBody>
+          </p:sp>
+        </mc:Fallback>
+      </mc:AlternateContent>
+    </p:spTree>
+    <p:extLst>
+      <p:ext uri="{BB962C8B-B14F-4D97-AF65-F5344CB8AC3E}">
+        <p14:creationId xmlns:p14="http://schemas.microsoft.com/office/powerpoint/2010/main" val="603713739"/>
+      </p:ext>
+    </p:extLst>
+  </p:cSld>
+  <p:clrMapOvr>
+    <a:masterClrMapping/>
+  </p:clrMapOvr>
+</p:sld>
+</file>
+
+<file path=ppt/slides/slide7.xml><?xml version="1.0" encoding="utf-8"?>
+<p:sld xmlns:a="http://schemas.openxmlformats.org/drawingml/2006/main" xmlns:r="http://schemas.openxmlformats.org/officeDocument/2006/relationships" xmlns:p="http://schemas.openxmlformats.org/presentationml/2006/main">
+  <p:cSld>
+    <p:spTree>
+      <p:nvGrpSpPr>
+        <p:cNvPr id="1" name=""/>
+        <p:cNvGrpSpPr/>
+        <p:nvPr/>
+      </p:nvGrpSpPr>
+      <p:grpSpPr>
+        <a:xfrm>
+          <a:off x="0" y="0"/>
+          <a:ext cx="0" cy="0"/>
+          <a:chOff x="0" y="0"/>
+          <a:chExt cx="0" cy="0"/>
+        </a:xfrm>
+      </p:grpSpPr>
+      <p:pic>
+        <p:nvPicPr>
+          <p:cNvPr id="3" name="Picture 2">
+            <a:extLst>
+              <a:ext uri="{FF2B5EF4-FFF2-40B4-BE49-F238E27FC236}">
+                <a16:creationId xmlns:a16="http://schemas.microsoft.com/office/drawing/2014/main" id="{EADB3598-D5FB-A941-AAEE-8A8C7471AA6B}"/>
+              </a:ext>
+            </a:extLst>
+          </p:cNvPr>
+          <p:cNvPicPr>
+            <a:picLocks noChangeAspect="1"/>
+          </p:cNvPicPr>
+          <p:nvPr/>
+        </p:nvPicPr>
+        <p:blipFill>
+          <a:blip r:embed="rId2"/>
+          <a:stretch>
+            <a:fillRect/>
+          </a:stretch>
+        </p:blipFill>
+        <p:spPr>
+          <a:xfrm>
+            <a:off x="0" y="21771"/>
+            <a:ext cx="10254343" cy="6836229"/>
+          </a:xfrm>
+          <a:prstGeom prst="rect">
+            <a:avLst/>
+          </a:prstGeom>
+        </p:spPr>
+      </p:pic>
+      <mc:AlternateContent xmlns:mc="http://schemas.openxmlformats.org/markup-compatibility/2006">
+        <mc:Choice xmlns:a14="http://schemas.microsoft.com/office/drawing/2010/main" Requires="a14">
+          <p:sp>
+            <p:nvSpPr>
+              <p:cNvPr id="4" name="Rectangle 3">
+                <a:extLst>
+                  <a:ext uri="{FF2B5EF4-FFF2-40B4-BE49-F238E27FC236}">
+                    <a16:creationId xmlns:a16="http://schemas.microsoft.com/office/drawing/2014/main" id="{CE874764-FA19-F340-A0AE-DF9D42D2CE0C}"/>
+                  </a:ext>
+                </a:extLst>
+              </p:cNvPr>
+              <p:cNvSpPr/>
+              <p:nvPr/>
+            </p:nvSpPr>
+            <p:spPr>
+              <a:xfrm rot="18729597">
+                <a:off x="7433403" y="5437244"/>
+                <a:ext cx="1048107" cy="490199"/>
+              </a:xfrm>
+              <a:prstGeom prst="rect">
+                <a:avLst/>
+              </a:prstGeom>
+            </p:spPr>
+            <p:txBody>
+              <a:bodyPr wrap="none">
+                <a:spAutoFit/>
+              </a:bodyPr>
+              <a:lstStyle/>
+              <a:p>
+                <a14:m>
+                  <m:oMathPara xmlns:m="http://schemas.openxmlformats.org/officeDocument/2006/math">
+                    <m:oMathParaPr>
+                      <m:jc m:val="centerGroup"/>
+                    </m:oMathParaPr>
+                    <m:oMath xmlns:m="http://schemas.openxmlformats.org/officeDocument/2006/math">
+                      <m:sSub>
+                        <m:sSubPr>
+                          <m:ctrlPr>
+                            <a:rPr lang="en-US" sz="2400">
+                              <a:latin typeface="Cambria Math" panose="02040503050406030204" pitchFamily="18" charset="0"/>
+                            </a:rPr>
+                          </m:ctrlPr>
+                        </m:sSubPr>
+                        <m:e>
+                          <m:r>
+                            <a:rPr lang="en-US" sz="2400" i="1">
+                              <a:latin typeface="Cambria Math" panose="02040503050406030204" pitchFamily="18" charset="0"/>
+                            </a:rPr>
+                            <m:t>𝜃</m:t>
+                          </m:r>
+                        </m:e>
+                        <m:sub>
+                          <m:r>
+                            <a:rPr lang="en-US" sz="2400" i="1">
+                              <a:latin typeface="Cambria Math" panose="02040503050406030204" pitchFamily="18" charset="0"/>
+                            </a:rPr>
+                            <m:t>𝑝𝑜𝑙𝑎𝑟</m:t>
+                          </m:r>
+                        </m:sub>
+                      </m:sSub>
+                    </m:oMath>
+                  </m:oMathPara>
+                </a14:m>
+                <a:endParaRPr lang="en-US" sz="2400" dirty="0"/>
+              </a:p>
+            </p:txBody>
+          </p:sp>
+        </mc:Choice>
+        <mc:Fallback>
+          <p:sp>
+            <p:nvSpPr>
+              <p:cNvPr id="4" name="Rectangle 3">
+                <a:extLst>
+                  <a:ext uri="{FF2B5EF4-FFF2-40B4-BE49-F238E27FC236}">
+                    <a16:creationId xmlns:a16="http://schemas.microsoft.com/office/drawing/2014/main" id="{CE874764-FA19-F340-A0AE-DF9D42D2CE0C}"/>
+                  </a:ext>
+                </a:extLst>
+              </p:cNvPr>
+              <p:cNvSpPr>
+                <a:spLocks noRot="1" noChangeAspect="1" noMove="1" noResize="1" noEditPoints="1" noAdjustHandles="1" noChangeArrowheads="1" noChangeShapeType="1" noTextEdit="1"/>
+              </p:cNvSpPr>
+              <p:nvPr/>
+            </p:nvSpPr>
+            <p:spPr>
+              <a:xfrm rot="18729597">
+                <a:off x="7433403" y="5437244"/>
+                <a:ext cx="1048107" cy="490199"/>
+              </a:xfrm>
+              <a:prstGeom prst="rect">
+                <a:avLst/>
+              </a:prstGeom>
+              <a:blipFill>
+                <a:blip r:embed="rId3"/>
+                <a:stretch>
+                  <a:fillRect/>
+                </a:stretch>
+              </a:blipFill>
+            </p:spPr>
+            <p:txBody>
+              <a:bodyPr/>
+              <a:lstStyle/>
+              <a:p>
+                <a:r>
+                  <a:rPr lang="en-US">
+                    <a:noFill/>
+                  </a:rPr>
+                  <a:t> </a:t>
+                </a:r>
+              </a:p>
+            </p:txBody>
+          </p:sp>
+        </mc:Fallback>
+      </mc:AlternateContent>
+      <mc:AlternateContent xmlns:mc="http://schemas.openxmlformats.org/markup-compatibility/2006">
+        <mc:Choice xmlns:a14="http://schemas.microsoft.com/office/drawing/2010/main" Requires="a14">
+          <p:sp>
+            <p:nvSpPr>
+              <p:cNvPr id="5" name="Rectangle 4">
+                <a:extLst>
+                  <a:ext uri="{FF2B5EF4-FFF2-40B4-BE49-F238E27FC236}">
+                    <a16:creationId xmlns:a16="http://schemas.microsoft.com/office/drawing/2014/main" id="{3D3F7974-91FA-774F-A1FF-18BABFFC3E03}"/>
+                  </a:ext>
+                </a:extLst>
+              </p:cNvPr>
+              <p:cNvSpPr/>
+              <p:nvPr/>
+            </p:nvSpPr>
+            <p:spPr>
+              <a:xfrm rot="318938">
+                <a:off x="3008161" y="5709444"/>
+                <a:ext cx="1407702" cy="461665"/>
+              </a:xfrm>
+              <a:prstGeom prst="rect">
+                <a:avLst/>
+              </a:prstGeom>
+            </p:spPr>
+            <p:txBody>
+              <a:bodyPr wrap="square">
+                <a:spAutoFit/>
+              </a:bodyPr>
+              <a:lstStyle/>
+              <a:p>
+                <a14:m>
+                  <m:oMathPara xmlns:m="http://schemas.openxmlformats.org/officeDocument/2006/math">
+                    <m:oMathParaPr>
+                      <m:jc m:val="centerGroup"/>
+                    </m:oMathParaPr>
+                    <m:oMath xmlns:m="http://schemas.openxmlformats.org/officeDocument/2006/math">
+                      <m:sSub>
+                        <m:sSubPr>
+                          <m:ctrlPr>
+                            <a:rPr lang="en-US" sz="2400" smtClean="0">
+                              <a:latin typeface="Cambria Math" panose="02040503050406030204" pitchFamily="18" charset="0"/>
+                            </a:rPr>
+                          </m:ctrlPr>
+                        </m:sSubPr>
+                        <m:e>
+                          <m:r>
+                            <a:rPr lang="en-US" sz="2400" i="1">
+                              <a:latin typeface="Cambria Math" panose="02040503050406030204" pitchFamily="18" charset="0"/>
+                            </a:rPr>
+                            <m:t>𝜃</m:t>
+                          </m:r>
+                        </m:e>
+                        <m:sub>
+                          <m:r>
+                            <a:rPr lang="en-US" sz="2400" b="0" i="1" smtClean="0">
+                              <a:latin typeface="Cambria Math" panose="02040503050406030204" pitchFamily="18" charset="0"/>
+                            </a:rPr>
+                            <m:t> </m:t>
+                          </m:r>
+                        </m:sub>
+                      </m:sSub>
+                    </m:oMath>
+                  </m:oMathPara>
+                </a14:m>
+                <a:endParaRPr lang="en-US" sz="2400" dirty="0"/>
+              </a:p>
+            </p:txBody>
+          </p:sp>
+        </mc:Choice>
+        <mc:Fallback>
+          <p:sp>
+            <p:nvSpPr>
+              <p:cNvPr id="5" name="Rectangle 4">
+                <a:extLst>
+                  <a:ext uri="{FF2B5EF4-FFF2-40B4-BE49-F238E27FC236}">
+                    <a16:creationId xmlns:a16="http://schemas.microsoft.com/office/drawing/2014/main" id="{3D3F7974-91FA-774F-A1FF-18BABFFC3E03}"/>
+                  </a:ext>
+                </a:extLst>
+              </p:cNvPr>
+              <p:cNvSpPr>
+                <a:spLocks noRot="1" noChangeAspect="1" noMove="1" noResize="1" noEditPoints="1" noAdjustHandles="1" noChangeArrowheads="1" noChangeShapeType="1" noTextEdit="1"/>
+              </p:cNvSpPr>
+              <p:nvPr/>
+            </p:nvSpPr>
+            <p:spPr>
+              <a:xfrm rot="318938">
+                <a:off x="3008161" y="5709444"/>
+                <a:ext cx="1407702" cy="461665"/>
+              </a:xfrm>
+              <a:prstGeom prst="rect">
+                <a:avLst/>
+              </a:prstGeom>
+              <a:blipFill>
+                <a:blip r:embed="rId4"/>
+                <a:stretch>
+                  <a:fillRect b="-8511"/>
+                </a:stretch>
+              </a:blipFill>
+            </p:spPr>
+            <p:txBody>
+              <a:bodyPr/>
+              <a:lstStyle/>
+              <a:p>
+                <a:r>
+                  <a:rPr lang="en-US">
+                    <a:noFill/>
+                  </a:rPr>
+                  <a:t> </a:t>
+                </a:r>
+              </a:p>
+            </p:txBody>
+          </p:sp>
+        </mc:Fallback>
+      </mc:AlternateContent>
+      <mc:AlternateContent xmlns:mc="http://schemas.openxmlformats.org/markup-compatibility/2006">
+        <mc:Choice xmlns:a14="http://schemas.microsoft.com/office/drawing/2010/main" Requires="a14">
+          <p:sp>
+            <p:nvSpPr>
+              <p:cNvPr id="6" name="Rectangle 5">
+                <a:extLst>
+                  <a:ext uri="{FF2B5EF4-FFF2-40B4-BE49-F238E27FC236}">
+                    <a16:creationId xmlns:a16="http://schemas.microsoft.com/office/drawing/2014/main" id="{85064533-D5F4-1C4C-B022-928016D47F3B}"/>
+                  </a:ext>
+                </a:extLst>
+              </p:cNvPr>
+              <p:cNvSpPr/>
+              <p:nvPr/>
+            </p:nvSpPr>
+            <p:spPr>
+              <a:xfrm>
+                <a:off x="9344467" y="2721820"/>
+                <a:ext cx="548868" cy="461665"/>
+              </a:xfrm>
+              <a:prstGeom prst="rect">
+                <a:avLst/>
+              </a:prstGeom>
+            </p:spPr>
+            <p:txBody>
+              <a:bodyPr wrap="none">
+                <a:spAutoFit/>
+              </a:bodyPr>
+              <a:lstStyle/>
+              <a:p>
+                <a14:m>
+                  <m:oMathPara xmlns:m="http://schemas.openxmlformats.org/officeDocument/2006/math">
+                    <m:oMathParaPr>
+                      <m:jc m:val="centerGroup"/>
+                    </m:oMathParaPr>
+                    <m:oMath xmlns:m="http://schemas.openxmlformats.org/officeDocument/2006/math">
+                      <m:r>
+                        <a:rPr lang="en-US" sz="2400" i="1">
+                          <a:latin typeface="Cambria Math" panose="02040503050406030204" pitchFamily="18" charset="0"/>
+                        </a:rPr>
+                        <m:t>𝑠𝑟</m:t>
+                      </m:r>
+                    </m:oMath>
+                  </m:oMathPara>
+                </a14:m>
+                <a:endParaRPr lang="en-US" sz="2400" dirty="0"/>
+              </a:p>
+            </p:txBody>
+          </p:sp>
+        </mc:Choice>
+        <mc:Fallback>
+          <p:sp>
+            <p:nvSpPr>
+              <p:cNvPr id="6" name="Rectangle 5">
+                <a:extLst>
+                  <a:ext uri="{FF2B5EF4-FFF2-40B4-BE49-F238E27FC236}">
+                    <a16:creationId xmlns:a16="http://schemas.microsoft.com/office/drawing/2014/main" id="{85064533-D5F4-1C4C-B022-928016D47F3B}"/>
+                  </a:ext>
+                </a:extLst>
+              </p:cNvPr>
+              <p:cNvSpPr>
+                <a:spLocks noRot="1" noChangeAspect="1" noMove="1" noResize="1" noEditPoints="1" noAdjustHandles="1" noChangeArrowheads="1" noChangeShapeType="1" noTextEdit="1"/>
+              </p:cNvSpPr>
+              <p:nvPr/>
+            </p:nvSpPr>
+            <p:spPr>
+              <a:xfrm>
+                <a:off x="9344467" y="2721820"/>
+                <a:ext cx="548868" cy="461665"/>
+              </a:xfrm>
+              <a:prstGeom prst="rect">
+                <a:avLst/>
+              </a:prstGeom>
+              <a:blipFill>
+                <a:blip r:embed="rId5"/>
+                <a:stretch>
+                  <a:fillRect/>
+                </a:stretch>
+              </a:blipFill>
+            </p:spPr>
+            <p:txBody>
+              <a:bodyPr/>
+              <a:lstStyle/>
+              <a:p>
+                <a:r>
+                  <a:rPr lang="en-US">
+                    <a:noFill/>
+                  </a:rPr>
+                  <a:t> </a:t>
+                </a:r>
+              </a:p>
+            </p:txBody>
+          </p:sp>
+        </mc:Fallback>
+      </mc:AlternateContent>
+    </p:spTree>
+    <p:extLst>
+      <p:ext uri="{BB962C8B-B14F-4D97-AF65-F5344CB8AC3E}">
+        <p14:creationId xmlns:p14="http://schemas.microsoft.com/office/powerpoint/2010/main" val="1892063858"/>
+      </p:ext>
+    </p:extLst>
+  </p:cSld>
+  <p:clrMapOvr>
+    <a:masterClrMapping/>
+  </p:clrMapOvr>
+</p:sld>
+</file>
+
+<file path=ppt/slides/slide8.xml><?xml version="1.0" encoding="utf-8"?>
+<p:sld xmlns:a="http://schemas.openxmlformats.org/drawingml/2006/main" xmlns:r="http://schemas.openxmlformats.org/officeDocument/2006/relationships" xmlns:p="http://schemas.openxmlformats.org/presentationml/2006/main">
+  <p:cSld>
+    <p:spTree>
+      <p:nvGrpSpPr>
+        <p:cNvPr id="1" name=""/>
+        <p:cNvGrpSpPr/>
+        <p:nvPr/>
+      </p:nvGrpSpPr>
+      <p:grpSpPr>
+        <a:xfrm>
+          <a:off x="0" y="0"/>
+          <a:ext cx="0" cy="0"/>
+          <a:chOff x="0" y="0"/>
+          <a:chExt cx="0" cy="0"/>
+        </a:xfrm>
+      </p:grpSpPr>
+      <p:pic>
+        <p:nvPicPr>
+          <p:cNvPr id="3" name="Picture 2">
+            <a:extLst>
+              <a:ext uri="{FF2B5EF4-FFF2-40B4-BE49-F238E27FC236}">
+                <a16:creationId xmlns:a16="http://schemas.microsoft.com/office/drawing/2014/main" id="{C0C0A6D2-FF75-E94B-AB80-77692FAA1850}"/>
+              </a:ext>
+            </a:extLst>
+          </p:cNvPr>
+          <p:cNvPicPr>
+            <a:picLocks noChangeAspect="1"/>
+          </p:cNvPicPr>
+          <p:nvPr/>
+        </p:nvPicPr>
+        <p:blipFill>
+          <a:blip r:embed="rId2"/>
+          <a:stretch>
+            <a:fillRect/>
+          </a:stretch>
+        </p:blipFill>
+        <p:spPr>
+          <a:xfrm>
+            <a:off x="0" y="0"/>
+            <a:ext cx="10352314" cy="6901543"/>
+          </a:xfrm>
+          <a:prstGeom prst="rect">
+            <a:avLst/>
+          </a:prstGeom>
+        </p:spPr>
+      </p:pic>
+      <mc:AlternateContent xmlns:mc="http://schemas.openxmlformats.org/markup-compatibility/2006">
+        <mc:Choice xmlns:a14="http://schemas.microsoft.com/office/drawing/2010/main" Requires="a14">
+          <p:sp>
+            <p:nvSpPr>
+              <p:cNvPr id="5" name="Rectangle 4">
+                <a:extLst>
+                  <a:ext uri="{FF2B5EF4-FFF2-40B4-BE49-F238E27FC236}">
+                    <a16:creationId xmlns:a16="http://schemas.microsoft.com/office/drawing/2014/main" id="{ADF74AB0-AA2E-4D44-96BB-04D11C61FB64}"/>
+                  </a:ext>
+                </a:extLst>
+              </p:cNvPr>
+              <p:cNvSpPr/>
+              <p:nvPr/>
+            </p:nvSpPr>
+            <p:spPr>
+              <a:xfrm rot="18729597">
+                <a:off x="7531375" y="5290288"/>
+                <a:ext cx="1048107" cy="490199"/>
+              </a:xfrm>
+              <a:prstGeom prst="rect">
+                <a:avLst/>
+              </a:prstGeom>
+            </p:spPr>
+            <p:txBody>
+              <a:bodyPr wrap="none">
+                <a:spAutoFit/>
+              </a:bodyPr>
+              <a:lstStyle/>
+              <a:p>
+                <a14:m>
+                  <m:oMathPara xmlns:m="http://schemas.openxmlformats.org/officeDocument/2006/math">
+                    <m:oMathParaPr>
+                      <m:jc m:val="centerGroup"/>
+                    </m:oMathParaPr>
+                    <m:oMath xmlns:m="http://schemas.openxmlformats.org/officeDocument/2006/math">
+                      <m:sSub>
+                        <m:sSubPr>
+                          <m:ctrlPr>
+                            <a:rPr lang="en-US" sz="2400">
+                              <a:latin typeface="Cambria Math" panose="02040503050406030204" pitchFamily="18" charset="0"/>
+                            </a:rPr>
+                          </m:ctrlPr>
+                        </m:sSubPr>
+                        <m:e>
+                          <m:r>
+                            <a:rPr lang="en-US" sz="2400" i="1">
+                              <a:latin typeface="Cambria Math" panose="02040503050406030204" pitchFamily="18" charset="0"/>
+                            </a:rPr>
+                            <m:t>𝜃</m:t>
+                          </m:r>
+                        </m:e>
+                        <m:sub>
+                          <m:r>
+                            <a:rPr lang="en-US" sz="2400" i="1">
+                              <a:latin typeface="Cambria Math" panose="02040503050406030204" pitchFamily="18" charset="0"/>
+                            </a:rPr>
+                            <m:t>𝑝𝑜𝑙𝑎𝑟</m:t>
+                          </m:r>
+                        </m:sub>
+                      </m:sSub>
+                    </m:oMath>
+                  </m:oMathPara>
+                </a14:m>
+                <a:endParaRPr lang="en-US" sz="2400" dirty="0"/>
+              </a:p>
+            </p:txBody>
+          </p:sp>
+        </mc:Choice>
+        <mc:Fallback>
+          <p:sp>
+            <p:nvSpPr>
+              <p:cNvPr id="5" name="Rectangle 4">
+                <a:extLst>
+                  <a:ext uri="{FF2B5EF4-FFF2-40B4-BE49-F238E27FC236}">
+                    <a16:creationId xmlns:a16="http://schemas.microsoft.com/office/drawing/2014/main" id="{ADF74AB0-AA2E-4D44-96BB-04D11C61FB64}"/>
+                  </a:ext>
+                </a:extLst>
+              </p:cNvPr>
+              <p:cNvSpPr>
+                <a:spLocks noRot="1" noChangeAspect="1" noMove="1" noResize="1" noEditPoints="1" noAdjustHandles="1" noChangeArrowheads="1" noChangeShapeType="1" noTextEdit="1"/>
+              </p:cNvSpPr>
+              <p:nvPr/>
+            </p:nvSpPr>
+            <p:spPr>
+              <a:xfrm rot="18729597">
+                <a:off x="7531375" y="5290288"/>
+                <a:ext cx="1048107" cy="490199"/>
+              </a:xfrm>
+              <a:prstGeom prst="rect">
+                <a:avLst/>
+              </a:prstGeom>
+              <a:blipFill>
+                <a:blip r:embed="rId3"/>
+                <a:stretch>
+                  <a:fillRect/>
+                </a:stretch>
+              </a:blipFill>
+            </p:spPr>
+            <p:txBody>
+              <a:bodyPr/>
+              <a:lstStyle/>
+              <a:p>
+                <a:r>
+                  <a:rPr lang="en-US">
+                    <a:noFill/>
+                  </a:rPr>
+                  <a:t> </a:t>
+                </a:r>
+              </a:p>
+            </p:txBody>
+          </p:sp>
+        </mc:Fallback>
+      </mc:AlternateContent>
+      <mc:AlternateContent xmlns:mc="http://schemas.openxmlformats.org/markup-compatibility/2006">
+        <mc:Choice xmlns:a14="http://schemas.microsoft.com/office/drawing/2010/main" Requires="a14">
+          <p:sp>
+            <p:nvSpPr>
+              <p:cNvPr id="6" name="Rectangle 5">
+                <a:extLst>
+                  <a:ext uri="{FF2B5EF4-FFF2-40B4-BE49-F238E27FC236}">
+                    <a16:creationId xmlns:a16="http://schemas.microsoft.com/office/drawing/2014/main" id="{675C0EA9-3378-B749-979F-772B4A0C61D8}"/>
+                  </a:ext>
+                </a:extLst>
+              </p:cNvPr>
+              <p:cNvSpPr/>
+              <p:nvPr/>
+            </p:nvSpPr>
+            <p:spPr>
+              <a:xfrm rot="318938">
+                <a:off x="3008161" y="5709444"/>
+                <a:ext cx="1407702" cy="461665"/>
+              </a:xfrm>
+              <a:prstGeom prst="rect">
+                <a:avLst/>
+              </a:prstGeom>
+            </p:spPr>
+            <p:txBody>
+              <a:bodyPr wrap="square">
+                <a:spAutoFit/>
+              </a:bodyPr>
+              <a:lstStyle/>
+              <a:p>
+                <a14:m>
+                  <m:oMathPara xmlns:m="http://schemas.openxmlformats.org/officeDocument/2006/math">
+                    <m:oMathParaPr>
+                      <m:jc m:val="centerGroup"/>
+                    </m:oMathParaPr>
+                    <m:oMath xmlns:m="http://schemas.openxmlformats.org/officeDocument/2006/math">
+                      <m:sSub>
+                        <m:sSubPr>
+                          <m:ctrlPr>
+                            <a:rPr lang="en-US" sz="2400" smtClean="0">
+                              <a:latin typeface="Cambria Math" panose="02040503050406030204" pitchFamily="18" charset="0"/>
+                            </a:rPr>
+                          </m:ctrlPr>
+                        </m:sSubPr>
+                        <m:e>
+                          <m:r>
+                            <a:rPr lang="en-US" sz="2400" i="1">
+                              <a:latin typeface="Cambria Math" panose="02040503050406030204" pitchFamily="18" charset="0"/>
+                            </a:rPr>
+                            <m:t>𝜃</m:t>
+                          </m:r>
+                        </m:e>
+                        <m:sub>
+                          <m:r>
+                            <a:rPr lang="en-US" sz="2400" b="0" i="1" smtClean="0">
+                              <a:latin typeface="Cambria Math" panose="02040503050406030204" pitchFamily="18" charset="0"/>
+                            </a:rPr>
+                            <m:t> </m:t>
+                          </m:r>
+                        </m:sub>
+                      </m:sSub>
+                    </m:oMath>
+                  </m:oMathPara>
+                </a14:m>
+                <a:endParaRPr lang="en-US" sz="2400" dirty="0"/>
+              </a:p>
+            </p:txBody>
+          </p:sp>
+        </mc:Choice>
+        <mc:Fallback>
+          <p:sp>
+            <p:nvSpPr>
+              <p:cNvPr id="6" name="Rectangle 5">
+                <a:extLst>
+                  <a:ext uri="{FF2B5EF4-FFF2-40B4-BE49-F238E27FC236}">
+                    <a16:creationId xmlns:a16="http://schemas.microsoft.com/office/drawing/2014/main" id="{675C0EA9-3378-B749-979F-772B4A0C61D8}"/>
+                  </a:ext>
+                </a:extLst>
+              </p:cNvPr>
+              <p:cNvSpPr>
+                <a:spLocks noRot="1" noChangeAspect="1" noMove="1" noResize="1" noEditPoints="1" noAdjustHandles="1" noChangeArrowheads="1" noChangeShapeType="1" noTextEdit="1"/>
+              </p:cNvSpPr>
+              <p:nvPr/>
+            </p:nvSpPr>
+            <p:spPr>
+              <a:xfrm rot="318938">
+                <a:off x="3008161" y="5709444"/>
+                <a:ext cx="1407702" cy="461665"/>
+              </a:xfrm>
+              <a:prstGeom prst="rect">
+                <a:avLst/>
+              </a:prstGeom>
+              <a:blipFill>
+                <a:blip r:embed="rId4"/>
+                <a:stretch>
+                  <a:fillRect b="-8511"/>
+                </a:stretch>
+              </a:blipFill>
+            </p:spPr>
+            <p:txBody>
+              <a:bodyPr/>
+              <a:lstStyle/>
+              <a:p>
+                <a:r>
+                  <a:rPr lang="en-US">
+                    <a:noFill/>
+                  </a:rPr>
+                  <a:t> </a:t>
+                </a:r>
+              </a:p>
+            </p:txBody>
+          </p:sp>
+        </mc:Fallback>
+      </mc:AlternateContent>
+      <mc:AlternateContent xmlns:mc="http://schemas.openxmlformats.org/markup-compatibility/2006">
+        <mc:Choice xmlns:a14="http://schemas.microsoft.com/office/drawing/2010/main" Requires="a14">
+          <p:sp>
+            <p:nvSpPr>
+              <p:cNvPr id="7" name="Rectangle 6">
+                <a:extLst>
+                  <a:ext uri="{FF2B5EF4-FFF2-40B4-BE49-F238E27FC236}">
+                    <a16:creationId xmlns:a16="http://schemas.microsoft.com/office/drawing/2014/main" id="{BC72A632-36D3-F74D-99EE-4A85A35C19FD}"/>
+                  </a:ext>
+                </a:extLst>
+              </p:cNvPr>
+              <p:cNvSpPr/>
+              <p:nvPr/>
+            </p:nvSpPr>
+            <p:spPr>
+              <a:xfrm>
+                <a:off x="9344467" y="2721820"/>
+                <a:ext cx="548868" cy="461665"/>
+              </a:xfrm>
+              <a:prstGeom prst="rect">
+                <a:avLst/>
+              </a:prstGeom>
+            </p:spPr>
+            <p:txBody>
+              <a:bodyPr wrap="square">
+                <a:spAutoFit/>
+              </a:bodyPr>
+              <a:lstStyle/>
+              <a:p>
+                <a14:m>
+                  <m:oMathPara xmlns:m="http://schemas.openxmlformats.org/officeDocument/2006/math">
+                    <m:oMathParaPr>
+                      <m:jc m:val="centerGroup"/>
+                    </m:oMathParaPr>
+                    <m:oMath xmlns:m="http://schemas.openxmlformats.org/officeDocument/2006/math">
+                      <m:r>
+                        <a:rPr lang="en-US" sz="2400" i="1">
+                          <a:latin typeface="Cambria Math" panose="02040503050406030204" pitchFamily="18" charset="0"/>
+                        </a:rPr>
+                        <m:t>𝑠𝑟</m:t>
+                      </m:r>
+                    </m:oMath>
+                  </m:oMathPara>
+                </a14:m>
+                <a:endParaRPr lang="en-US" sz="2400" dirty="0"/>
+              </a:p>
+            </p:txBody>
+          </p:sp>
+        </mc:Choice>
+        <mc:Fallback>
+          <p:sp>
+            <p:nvSpPr>
+              <p:cNvPr id="7" name="Rectangle 6">
+                <a:extLst>
+                  <a:ext uri="{FF2B5EF4-FFF2-40B4-BE49-F238E27FC236}">
+                    <a16:creationId xmlns:a16="http://schemas.microsoft.com/office/drawing/2014/main" id="{BC72A632-36D3-F74D-99EE-4A85A35C19FD}"/>
+                  </a:ext>
+                </a:extLst>
+              </p:cNvPr>
+              <p:cNvSpPr>
+                <a:spLocks noRot="1" noChangeAspect="1" noMove="1" noResize="1" noEditPoints="1" noAdjustHandles="1" noChangeArrowheads="1" noChangeShapeType="1" noTextEdit="1"/>
+              </p:cNvSpPr>
+              <p:nvPr/>
+            </p:nvSpPr>
+            <p:spPr>
+              <a:xfrm>
+                <a:off x="9344467" y="2721820"/>
+                <a:ext cx="548868" cy="461665"/>
+              </a:xfrm>
+              <a:prstGeom prst="rect">
+                <a:avLst/>
+              </a:prstGeom>
+              <a:blipFill>
+                <a:blip r:embed="rId5"/>
+                <a:stretch>
+                  <a:fillRect/>
+                </a:stretch>
+              </a:blipFill>
+            </p:spPr>
+            <p:txBody>
+              <a:bodyPr/>
+              <a:lstStyle/>
+              <a:p>
+                <a:r>
+                  <a:rPr lang="en-US">
+                    <a:noFill/>
+                  </a:rPr>
+                  <a:t> </a:t>
+                </a:r>
+              </a:p>
+            </p:txBody>
+          </p:sp>
+        </mc:Fallback>
+      </mc:AlternateContent>
+    </p:spTree>
+    <p:extLst>
+      <p:ext uri="{BB962C8B-B14F-4D97-AF65-F5344CB8AC3E}">
+        <p14:creationId xmlns:p14="http://schemas.microsoft.com/office/powerpoint/2010/main" val="1967413755"/>
+      </p:ext>
+    </p:extLst>
+  </p:cSld>
+  <p:clrMapOvr>
+    <a:masterClrMapping/>
+  </p:clrMapOvr>
+</p:sld>
+</file>
+
+<file path=ppt/slides/slide9.xml><?xml version="1.0" encoding="utf-8"?>
+<p:sld xmlns:a="http://schemas.openxmlformats.org/drawingml/2006/main" xmlns:r="http://schemas.openxmlformats.org/officeDocument/2006/relationships" xmlns:p="http://schemas.openxmlformats.org/presentationml/2006/main">
+  <p:cSld>
+    <p:spTree>
+      <p:nvGrpSpPr>
+        <p:cNvPr id="1" name=""/>
+        <p:cNvGrpSpPr/>
+        <p:nvPr/>
+      </p:nvGrpSpPr>
+      <p:grpSpPr>
+        <a:xfrm>
+          <a:off x="0" y="0"/>
+          <a:ext cx="0" cy="0"/>
+          <a:chOff x="0" y="0"/>
+          <a:chExt cx="0" cy="0"/>
+        </a:xfrm>
+      </p:grpSpPr>
+      <p:pic>
+        <p:nvPicPr>
+          <p:cNvPr id="3" name="Picture 2">
+            <a:extLst>
+              <a:ext uri="{FF2B5EF4-FFF2-40B4-BE49-F238E27FC236}">
+                <a16:creationId xmlns:a16="http://schemas.microsoft.com/office/drawing/2014/main" id="{98FD17CC-C8FC-A644-AC85-1B95A61D35D6}"/>
+              </a:ext>
+            </a:extLst>
+          </p:cNvPr>
+          <p:cNvPicPr>
+            <a:picLocks noChangeAspect="1"/>
+          </p:cNvPicPr>
+          <p:nvPr/>
+        </p:nvPicPr>
+        <p:blipFill>
+          <a:blip r:embed="rId2"/>
+          <a:stretch>
+            <a:fillRect/>
+          </a:stretch>
+        </p:blipFill>
+        <p:spPr>
+          <a:xfrm>
+            <a:off x="581889" y="621145"/>
+            <a:ext cx="9254837" cy="6169891"/>
+          </a:xfrm>
+          <a:prstGeom prst="rect">
+            <a:avLst/>
+          </a:prstGeom>
+        </p:spPr>
+      </p:pic>
+      <mc:AlternateContent xmlns:mc="http://schemas.openxmlformats.org/markup-compatibility/2006">
+        <mc:Choice xmlns:a14="http://schemas.microsoft.com/office/drawing/2010/main" Requires="a14">
+          <p:sp>
+            <p:nvSpPr>
+              <p:cNvPr id="4" name="Rectangle 3">
+                <a:extLst>
+                  <a:ext uri="{FF2B5EF4-FFF2-40B4-BE49-F238E27FC236}">
+                    <a16:creationId xmlns:a16="http://schemas.microsoft.com/office/drawing/2014/main" id="{3A92C1A7-183F-D847-9C55-B259B79FE5F4}"/>
+                  </a:ext>
+                </a:extLst>
+              </p:cNvPr>
+              <p:cNvSpPr/>
+              <p:nvPr/>
+            </p:nvSpPr>
+            <p:spPr>
+              <a:xfrm rot="18729597">
+                <a:off x="7531375" y="5290288"/>
+                <a:ext cx="1048107" cy="490199"/>
+              </a:xfrm>
+              <a:prstGeom prst="rect">
+                <a:avLst/>
+              </a:prstGeom>
+            </p:spPr>
+            <p:txBody>
+              <a:bodyPr wrap="none">
+                <a:spAutoFit/>
+              </a:bodyPr>
+              <a:lstStyle/>
+              <a:p>
+                <a14:m>
+                  <m:oMathPara xmlns:m="http://schemas.openxmlformats.org/officeDocument/2006/math">
+                    <m:oMathParaPr>
+                      <m:jc m:val="centerGroup"/>
+                    </m:oMathParaPr>
+                    <m:oMath xmlns:m="http://schemas.openxmlformats.org/officeDocument/2006/math">
+                      <m:sSub>
+                        <m:sSubPr>
+                          <m:ctrlPr>
+                            <a:rPr lang="en-US" sz="2400">
+                              <a:latin typeface="Cambria Math" panose="02040503050406030204" pitchFamily="18" charset="0"/>
+                            </a:rPr>
+                          </m:ctrlPr>
+                        </m:sSubPr>
+                        <m:e>
+                          <m:r>
+                            <a:rPr lang="en-US" sz="2400" i="1">
+                              <a:latin typeface="Cambria Math" panose="02040503050406030204" pitchFamily="18" charset="0"/>
+                            </a:rPr>
+                            <m:t>𝜃</m:t>
+                          </m:r>
+                        </m:e>
+                        <m:sub>
+                          <m:r>
+                            <a:rPr lang="en-US" sz="2400" i="1">
+                              <a:latin typeface="Cambria Math" panose="02040503050406030204" pitchFamily="18" charset="0"/>
+                            </a:rPr>
+                            <m:t>𝑝𝑜𝑙𝑎𝑟</m:t>
+                          </m:r>
+                        </m:sub>
+                      </m:sSub>
+                    </m:oMath>
+                  </m:oMathPara>
+                </a14:m>
+                <a:endParaRPr lang="en-US" sz="2400" dirty="0"/>
+              </a:p>
+            </p:txBody>
+          </p:sp>
+        </mc:Choice>
+        <mc:Fallback>
+          <p:sp>
+            <p:nvSpPr>
+              <p:cNvPr id="4" name="Rectangle 3">
+                <a:extLst>
+                  <a:ext uri="{FF2B5EF4-FFF2-40B4-BE49-F238E27FC236}">
+                    <a16:creationId xmlns:a16="http://schemas.microsoft.com/office/drawing/2014/main" id="{3A92C1A7-183F-D847-9C55-B259B79FE5F4}"/>
+                  </a:ext>
+                </a:extLst>
+              </p:cNvPr>
+              <p:cNvSpPr>
+                <a:spLocks noRot="1" noChangeAspect="1" noMove="1" noResize="1" noEditPoints="1" noAdjustHandles="1" noChangeArrowheads="1" noChangeShapeType="1" noTextEdit="1"/>
+              </p:cNvSpPr>
+              <p:nvPr/>
+            </p:nvSpPr>
+            <p:spPr>
+              <a:xfrm rot="18729597">
+                <a:off x="7531375" y="5290288"/>
+                <a:ext cx="1048107" cy="490199"/>
+              </a:xfrm>
+              <a:prstGeom prst="rect">
+                <a:avLst/>
+              </a:prstGeom>
+              <a:blipFill>
+                <a:blip r:embed="rId3"/>
+                <a:stretch>
+                  <a:fillRect/>
+                </a:stretch>
+              </a:blipFill>
+            </p:spPr>
+            <p:txBody>
+              <a:bodyPr/>
+              <a:lstStyle/>
+              <a:p>
+                <a:r>
+                  <a:rPr lang="en-US">
+                    <a:noFill/>
+                  </a:rPr>
+                  <a:t> </a:t>
+                </a:r>
+              </a:p>
+            </p:txBody>
+          </p:sp>
+        </mc:Fallback>
+      </mc:AlternateContent>
+      <mc:AlternateContent xmlns:mc="http://schemas.openxmlformats.org/markup-compatibility/2006">
+        <mc:Choice xmlns:a14="http://schemas.microsoft.com/office/drawing/2010/main" Requires="a14">
+          <p:sp>
+            <p:nvSpPr>
+              <p:cNvPr id="5" name="Rectangle 4">
+                <a:extLst>
+                  <a:ext uri="{FF2B5EF4-FFF2-40B4-BE49-F238E27FC236}">
+                    <a16:creationId xmlns:a16="http://schemas.microsoft.com/office/drawing/2014/main" id="{92BEC732-8529-F64B-BED2-3A401182AD8B}"/>
+                  </a:ext>
+                </a:extLst>
+              </p:cNvPr>
+              <p:cNvSpPr/>
+              <p:nvPr/>
+            </p:nvSpPr>
+            <p:spPr>
+              <a:xfrm rot="318938">
+                <a:off x="3008161" y="5709444"/>
+                <a:ext cx="1407702" cy="461665"/>
+              </a:xfrm>
+              <a:prstGeom prst="rect">
+                <a:avLst/>
+              </a:prstGeom>
+            </p:spPr>
+            <p:txBody>
+              <a:bodyPr wrap="square">
+                <a:spAutoFit/>
+              </a:bodyPr>
+              <a:lstStyle/>
+              <a:p>
+                <a14:m>
+                  <m:oMathPara xmlns:m="http://schemas.openxmlformats.org/officeDocument/2006/math">
+                    <m:oMathParaPr>
+                      <m:jc m:val="centerGroup"/>
+                    </m:oMathParaPr>
+                    <m:oMath xmlns:m="http://schemas.openxmlformats.org/officeDocument/2006/math">
+                      <m:sSub>
+                        <m:sSubPr>
+                          <m:ctrlPr>
+                            <a:rPr lang="en-US" sz="2400" smtClean="0">
+                              <a:latin typeface="Cambria Math" panose="02040503050406030204" pitchFamily="18" charset="0"/>
+                            </a:rPr>
+                          </m:ctrlPr>
+                        </m:sSubPr>
+                        <m:e>
+                          <m:r>
+                            <a:rPr lang="en-US" sz="2400" i="1">
+                              <a:latin typeface="Cambria Math" panose="02040503050406030204" pitchFamily="18" charset="0"/>
+                            </a:rPr>
+                            <m:t>𝜃</m:t>
+                          </m:r>
+                        </m:e>
+                        <m:sub>
+                          <m:r>
+                            <a:rPr lang="en-US" sz="2400" b="0" i="1" smtClean="0">
+                              <a:latin typeface="Cambria Math" panose="02040503050406030204" pitchFamily="18" charset="0"/>
+                            </a:rPr>
+                            <m:t> </m:t>
+                          </m:r>
+                        </m:sub>
+                      </m:sSub>
+                    </m:oMath>
+                  </m:oMathPara>
+                </a14:m>
+                <a:endParaRPr lang="en-US" sz="2400" dirty="0"/>
+              </a:p>
+            </p:txBody>
+          </p:sp>
+        </mc:Choice>
+        <mc:Fallback>
+          <p:sp>
+            <p:nvSpPr>
+              <p:cNvPr id="5" name="Rectangle 4">
+                <a:extLst>
+                  <a:ext uri="{FF2B5EF4-FFF2-40B4-BE49-F238E27FC236}">
+                    <a16:creationId xmlns:a16="http://schemas.microsoft.com/office/drawing/2014/main" id="{92BEC732-8529-F64B-BED2-3A401182AD8B}"/>
+                  </a:ext>
+                </a:extLst>
+              </p:cNvPr>
+              <p:cNvSpPr>
+                <a:spLocks noRot="1" noChangeAspect="1" noMove="1" noResize="1" noEditPoints="1" noAdjustHandles="1" noChangeArrowheads="1" noChangeShapeType="1" noTextEdit="1"/>
+              </p:cNvSpPr>
+              <p:nvPr/>
+            </p:nvSpPr>
+            <p:spPr>
+              <a:xfrm rot="318938">
+                <a:off x="3008161" y="5709444"/>
+                <a:ext cx="1407702" cy="461665"/>
+              </a:xfrm>
+              <a:prstGeom prst="rect">
+                <a:avLst/>
+              </a:prstGeom>
+              <a:blipFill>
+                <a:blip r:embed="rId4"/>
+                <a:stretch>
+                  <a:fillRect b="-8511"/>
+                </a:stretch>
+              </a:blipFill>
+            </p:spPr>
+            <p:txBody>
+              <a:bodyPr/>
+              <a:lstStyle/>
+              <a:p>
+                <a:r>
+                  <a:rPr lang="en-US">
+                    <a:noFill/>
+                  </a:rPr>
+                  <a:t> </a:t>
+                </a:r>
+              </a:p>
+            </p:txBody>
+          </p:sp>
+        </mc:Fallback>
+      </mc:AlternateContent>
+      <mc:AlternateContent xmlns:mc="http://schemas.openxmlformats.org/markup-compatibility/2006">
+        <mc:Choice xmlns:a14="http://schemas.microsoft.com/office/drawing/2010/main" Requires="a14">
+          <p:sp>
+            <p:nvSpPr>
+              <p:cNvPr id="6" name="Rectangle 5">
+                <a:extLst>
+                  <a:ext uri="{FF2B5EF4-FFF2-40B4-BE49-F238E27FC236}">
+                    <a16:creationId xmlns:a16="http://schemas.microsoft.com/office/drawing/2014/main" id="{86F32DCF-00A9-CA4B-AEEE-A2209DD95394}"/>
+                  </a:ext>
+                </a:extLst>
+              </p:cNvPr>
+              <p:cNvSpPr/>
+              <p:nvPr/>
+            </p:nvSpPr>
+            <p:spPr>
+              <a:xfrm>
+                <a:off x="8755114" y="3244425"/>
+                <a:ext cx="548868" cy="461665"/>
+              </a:xfrm>
+              <a:prstGeom prst="rect">
+                <a:avLst/>
+              </a:prstGeom>
+            </p:spPr>
+            <p:txBody>
+              <a:bodyPr wrap="square">
+                <a:spAutoFit/>
+              </a:bodyPr>
+              <a:lstStyle/>
+              <a:p>
+                <a14:m>
+                  <m:oMathPara xmlns:m="http://schemas.openxmlformats.org/officeDocument/2006/math">
+                    <m:oMathParaPr>
+                      <m:jc m:val="centerGroup"/>
+                    </m:oMathParaPr>
+                    <m:oMath xmlns:m="http://schemas.openxmlformats.org/officeDocument/2006/math">
+                      <m:r>
+                        <a:rPr lang="en-US" sz="2400" b="0" i="1" smtClean="0">
+                          <a:latin typeface="Cambria Math" panose="02040503050406030204" pitchFamily="18" charset="0"/>
+                        </a:rPr>
+                        <m:t>𝑐</m:t>
+                      </m:r>
+                      <m:sSup>
+                        <m:sSupPr>
+                          <m:ctrlPr>
+                            <a:rPr lang="en-US" sz="2400" b="0" i="1" smtClean="0">
+                              <a:latin typeface="Cambria Math" panose="02040503050406030204" pitchFamily="18" charset="0"/>
+                            </a:rPr>
+                          </m:ctrlPr>
+                        </m:sSupPr>
+                        <m:e>
+                          <m:r>
+                            <a:rPr lang="en-US" sz="2400" b="0" i="1" smtClean="0">
+                              <a:latin typeface="Cambria Math" panose="02040503050406030204" pitchFamily="18" charset="0"/>
+                            </a:rPr>
+                            <m:t>𝑚</m:t>
+                          </m:r>
+                        </m:e>
+                        <m:sup>
+                          <m:r>
+                            <a:rPr lang="en-US" sz="2400" b="0" i="1" smtClean="0">
+                              <a:latin typeface="Cambria Math" panose="02040503050406030204" pitchFamily="18" charset="0"/>
+                            </a:rPr>
+                            <m:t>2</m:t>
+                          </m:r>
+                        </m:sup>
+                      </m:sSup>
+                      <m:r>
+                        <a:rPr lang="en-US" sz="2400" i="1">
+                          <a:latin typeface="Cambria Math" panose="02040503050406030204" pitchFamily="18" charset="0"/>
+                        </a:rPr>
+                        <m:t>𝑠𝑟</m:t>
+                      </m:r>
+                    </m:oMath>
+                  </m:oMathPara>
+                </a14:m>
+                <a:endParaRPr lang="en-US" sz="2400" dirty="0"/>
+              </a:p>
+            </p:txBody>
+          </p:sp>
+        </mc:Choice>
+        <mc:Fallback>
+          <p:sp>
+            <p:nvSpPr>
+              <p:cNvPr id="6" name="Rectangle 5">
+                <a:extLst>
+                  <a:ext uri="{FF2B5EF4-FFF2-40B4-BE49-F238E27FC236}">
+                    <a16:creationId xmlns:a16="http://schemas.microsoft.com/office/drawing/2014/main" id="{86F32DCF-00A9-CA4B-AEEE-A2209DD95394}"/>
+                  </a:ext>
+                </a:extLst>
+              </p:cNvPr>
+              <p:cNvSpPr>
+                <a:spLocks noRot="1" noChangeAspect="1" noMove="1" noResize="1" noEditPoints="1" noAdjustHandles="1" noChangeArrowheads="1" noChangeShapeType="1" noTextEdit="1"/>
+              </p:cNvSpPr>
+              <p:nvPr/>
+            </p:nvSpPr>
+            <p:spPr>
+              <a:xfrm>
+                <a:off x="8755114" y="3244425"/>
+                <a:ext cx="548868" cy="461665"/>
+              </a:xfrm>
+              <a:prstGeom prst="rect">
+                <a:avLst/>
+              </a:prstGeom>
+              <a:blipFill>
+                <a:blip r:embed="rId5"/>
+                <a:stretch>
+                  <a:fillRect r="-77778"/>
+                </a:stretch>
+              </a:blipFill>
+            </p:spPr>
+            <p:txBody>
+              <a:bodyPr/>
+              <a:lstStyle/>
+              <a:p>
+                <a:r>
+                  <a:rPr lang="en-US">
+                    <a:noFill/>
+                  </a:rPr>
+                  <a:t> </a:t>
+                </a:r>
+              </a:p>
+            </p:txBody>
+          </p:sp>
+        </mc:Fallback>
+      </mc:AlternateContent>
+    </p:spTree>
+    <p:extLst>
+      <p:ext uri="{BB962C8B-B14F-4D97-AF65-F5344CB8AC3E}">
+        <p14:creationId xmlns:p14="http://schemas.microsoft.com/office/powerpoint/2010/main" val="59881523"/>
       </p:ext>
     </p:extLst>
   </p:cSld>

</xml_diff>